<commit_message>
Update workflow and prep for workshop
</commit_message>
<xml_diff>
--- a/workshop/dada2_workflow_intro.pptx
+++ b/workshop/dada2_workflow_intro.pptx
@@ -5,7 +5,7 @@
     <p:sldMasterId id="2147483648" r:id="rId1"/>
   </p:sldMasterIdLst>
   <p:notesMasterIdLst>
-    <p:notesMasterId r:id="rId27"/>
+    <p:notesMasterId r:id="rId28"/>
   </p:notesMasterIdLst>
   <p:sldIdLst>
     <p:sldId id="256" r:id="rId2"/>
@@ -29,10 +29,11 @@
     <p:sldId id="261" r:id="rId20"/>
     <p:sldId id="263" r:id="rId21"/>
     <p:sldId id="264" r:id="rId22"/>
-    <p:sldId id="268" r:id="rId23"/>
-    <p:sldId id="266" r:id="rId24"/>
-    <p:sldId id="269" r:id="rId25"/>
-    <p:sldId id="281" r:id="rId26"/>
+    <p:sldId id="291" r:id="rId23"/>
+    <p:sldId id="292" r:id="rId24"/>
+    <p:sldId id="293" r:id="rId25"/>
+    <p:sldId id="266" r:id="rId26"/>
+    <p:sldId id="281" r:id="rId27"/>
   </p:sldIdLst>
   <p:sldSz cx="12192000" cy="6858000"/>
   <p:notesSz cx="6858000" cy="9144000"/>
@@ -131,6 +132,11 @@
       </a:defRPr>
     </a:lvl9pPr>
   </p:defaultTextStyle>
+  <p:extLst>
+    <p:ext uri="{EFAFB233-063F-42B5-8137-9DF3F51BA10A}">
+      <p15:sldGuideLst xmlns:p15="http://schemas.microsoft.com/office/powerpoint/2012/main"/>
+    </p:ext>
+  </p:extLst>
 </p:presentation>
 </file>
 
@@ -3044,14 +3050,35 @@
         </dgm:presLayoutVars>
       </dgm:prSet>
       <dgm:spPr/>
+      <dgm:t>
+        <a:bodyPr/>
+        <a:lstStyle/>
+        <a:p>
+          <a:endParaRPr lang="en-US"/>
+        </a:p>
+      </dgm:t>
     </dgm:pt>
     <dgm:pt modelId="{2E4DDA71-63BB-094D-AC2D-4AB8D484B16E}" type="pres">
       <dgm:prSet presAssocID="{F07EFE35-C7D6-2F4A-ACE1-852E8BCC27F8}" presName="sibTrans" presStyleLbl="sibTrans2D1" presStyleIdx="0" presStyleCnt="10"/>
       <dgm:spPr/>
+      <dgm:t>
+        <a:bodyPr/>
+        <a:lstStyle/>
+        <a:p>
+          <a:endParaRPr lang="en-US"/>
+        </a:p>
+      </dgm:t>
     </dgm:pt>
     <dgm:pt modelId="{8E6A274D-A0FE-1D4C-93E4-8B82CE196E3B}" type="pres">
       <dgm:prSet presAssocID="{F07EFE35-C7D6-2F4A-ACE1-852E8BCC27F8}" presName="connectorText" presStyleLbl="sibTrans2D1" presStyleIdx="0" presStyleCnt="10"/>
       <dgm:spPr/>
+      <dgm:t>
+        <a:bodyPr/>
+        <a:lstStyle/>
+        <a:p>
+          <a:endParaRPr lang="en-US"/>
+        </a:p>
+      </dgm:t>
     </dgm:pt>
     <dgm:pt modelId="{1C485498-7FB6-E049-B09F-F628CDE14F70}" type="pres">
       <dgm:prSet presAssocID="{D08C936B-7EA2-5E4D-8C40-D57C0BDF2402}" presName="node" presStyleLbl="node1" presStyleIdx="1" presStyleCnt="11" custLinFactX="39846" custLinFactNeighborX="100000" custLinFactNeighborY="23162">
@@ -3060,14 +3087,35 @@
         </dgm:presLayoutVars>
       </dgm:prSet>
       <dgm:spPr/>
+      <dgm:t>
+        <a:bodyPr/>
+        <a:lstStyle/>
+        <a:p>
+          <a:endParaRPr lang="en-US"/>
+        </a:p>
+      </dgm:t>
     </dgm:pt>
     <dgm:pt modelId="{7F931FB3-A9BA-174F-9128-E3CB763512CF}" type="pres">
       <dgm:prSet presAssocID="{327C20B1-0843-CE4C-8F29-D979A5FC89AD}" presName="sibTrans" presStyleLbl="sibTrans2D1" presStyleIdx="1" presStyleCnt="10"/>
       <dgm:spPr/>
+      <dgm:t>
+        <a:bodyPr/>
+        <a:lstStyle/>
+        <a:p>
+          <a:endParaRPr lang="en-US"/>
+        </a:p>
+      </dgm:t>
     </dgm:pt>
     <dgm:pt modelId="{D950472B-4AF5-914A-83A6-61A893741A8F}" type="pres">
       <dgm:prSet presAssocID="{327C20B1-0843-CE4C-8F29-D979A5FC89AD}" presName="connectorText" presStyleLbl="sibTrans2D1" presStyleIdx="1" presStyleCnt="10"/>
       <dgm:spPr/>
+      <dgm:t>
+        <a:bodyPr/>
+        <a:lstStyle/>
+        <a:p>
+          <a:endParaRPr lang="en-US"/>
+        </a:p>
+      </dgm:t>
     </dgm:pt>
     <dgm:pt modelId="{B525638F-6600-2B44-8009-0472B2361A11}" type="pres">
       <dgm:prSet presAssocID="{E45F3AD5-D2F4-D94E-90B2-7AA9F030172E}" presName="node" presStyleLbl="node1" presStyleIdx="2" presStyleCnt="11" custLinFactX="40822" custLinFactNeighborX="100000" custLinFactNeighborY="23162">
@@ -3076,14 +3124,35 @@
         </dgm:presLayoutVars>
       </dgm:prSet>
       <dgm:spPr/>
+      <dgm:t>
+        <a:bodyPr/>
+        <a:lstStyle/>
+        <a:p>
+          <a:endParaRPr lang="en-US"/>
+        </a:p>
+      </dgm:t>
     </dgm:pt>
     <dgm:pt modelId="{21984D2B-C062-F042-A872-A2D9A22C4D0C}" type="pres">
       <dgm:prSet presAssocID="{710A75B3-FF32-294D-AAB2-6303F19C0F38}" presName="sibTrans" presStyleLbl="sibTrans2D1" presStyleIdx="2" presStyleCnt="10"/>
       <dgm:spPr/>
+      <dgm:t>
+        <a:bodyPr/>
+        <a:lstStyle/>
+        <a:p>
+          <a:endParaRPr lang="en-US"/>
+        </a:p>
+      </dgm:t>
     </dgm:pt>
     <dgm:pt modelId="{295D751B-A105-EE42-9529-A46FA718FD65}" type="pres">
       <dgm:prSet presAssocID="{710A75B3-FF32-294D-AAB2-6303F19C0F38}" presName="connectorText" presStyleLbl="sibTrans2D1" presStyleIdx="2" presStyleCnt="10"/>
       <dgm:spPr/>
+      <dgm:t>
+        <a:bodyPr/>
+        <a:lstStyle/>
+        <a:p>
+          <a:endParaRPr lang="en-US"/>
+        </a:p>
+      </dgm:t>
     </dgm:pt>
     <dgm:pt modelId="{607ED82F-0153-9648-85A9-FD2598ED9CD4}" type="pres">
       <dgm:prSet presAssocID="{0C5C60D5-67E7-1447-9645-12655641CA4D}" presName="node" presStyleLbl="node1" presStyleIdx="3" presStyleCnt="11" custLinFactX="40823" custLinFactNeighborX="100000" custLinFactNeighborY="23162">
@@ -3092,14 +3161,35 @@
         </dgm:presLayoutVars>
       </dgm:prSet>
       <dgm:spPr/>
+      <dgm:t>
+        <a:bodyPr/>
+        <a:lstStyle/>
+        <a:p>
+          <a:endParaRPr lang="en-US"/>
+        </a:p>
+      </dgm:t>
     </dgm:pt>
     <dgm:pt modelId="{36F3A529-E509-4D46-8931-0B81FC1641D8}" type="pres">
       <dgm:prSet presAssocID="{274E1360-4211-6C46-B995-93610EBD938A}" presName="sibTrans" presStyleLbl="sibTrans2D1" presStyleIdx="3" presStyleCnt="10"/>
       <dgm:spPr/>
+      <dgm:t>
+        <a:bodyPr/>
+        <a:lstStyle/>
+        <a:p>
+          <a:endParaRPr lang="en-US"/>
+        </a:p>
+      </dgm:t>
     </dgm:pt>
     <dgm:pt modelId="{0F63130F-B27E-3241-99EB-836E0E0D4300}" type="pres">
       <dgm:prSet presAssocID="{274E1360-4211-6C46-B995-93610EBD938A}" presName="connectorText" presStyleLbl="sibTrans2D1" presStyleIdx="3" presStyleCnt="10"/>
       <dgm:spPr/>
+      <dgm:t>
+        <a:bodyPr/>
+        <a:lstStyle/>
+        <a:p>
+          <a:endParaRPr lang="en-US"/>
+        </a:p>
+      </dgm:t>
     </dgm:pt>
     <dgm:pt modelId="{9CDCDBFC-89AE-7742-BA04-469CA2CB8838}" type="pres">
       <dgm:prSet presAssocID="{F711D389-95A5-144D-A8A1-4ABDD989C0D7}" presName="node" presStyleLbl="node1" presStyleIdx="4" presStyleCnt="11" custLinFactY="80660" custLinFactNeighborX="2780" custLinFactNeighborY="100000">
@@ -3108,14 +3198,35 @@
         </dgm:presLayoutVars>
       </dgm:prSet>
       <dgm:spPr/>
+      <dgm:t>
+        <a:bodyPr/>
+        <a:lstStyle/>
+        <a:p>
+          <a:endParaRPr lang="en-US"/>
+        </a:p>
+      </dgm:t>
     </dgm:pt>
     <dgm:pt modelId="{20955F39-7A33-6145-AED8-600523AC68A6}" type="pres">
       <dgm:prSet presAssocID="{1F23692B-FE4B-E74F-8AE3-0C70656CDDEB}" presName="sibTrans" presStyleLbl="sibTrans2D1" presStyleIdx="4" presStyleCnt="10"/>
       <dgm:spPr/>
+      <dgm:t>
+        <a:bodyPr/>
+        <a:lstStyle/>
+        <a:p>
+          <a:endParaRPr lang="en-US"/>
+        </a:p>
+      </dgm:t>
     </dgm:pt>
     <dgm:pt modelId="{6E7E466E-B2C1-0E48-B811-BF510FAE457A}" type="pres">
       <dgm:prSet presAssocID="{1F23692B-FE4B-E74F-8AE3-0C70656CDDEB}" presName="connectorText" presStyleLbl="sibTrans2D1" presStyleIdx="4" presStyleCnt="10"/>
       <dgm:spPr/>
+      <dgm:t>
+        <a:bodyPr/>
+        <a:lstStyle/>
+        <a:p>
+          <a:endParaRPr lang="en-US"/>
+        </a:p>
+      </dgm:t>
     </dgm:pt>
     <dgm:pt modelId="{6FA43795-8FB5-1D4D-8051-02A937C5DB7C}" type="pres">
       <dgm:prSet presAssocID="{05414E78-B7A0-BE4D-9B45-C65E0397D141}" presName="node" presStyleLbl="node1" presStyleIdx="5" presStyleCnt="11" custLinFactX="-37116" custLinFactNeighborX="-100000" custLinFactNeighborY="13897">
@@ -3135,10 +3246,24 @@
     <dgm:pt modelId="{F401399D-B947-3642-BA1A-919842D84B49}" type="pres">
       <dgm:prSet presAssocID="{D19848FA-C9A2-434B-A708-EF1E865C7B6E}" presName="sibTrans" presStyleLbl="sibTrans2D1" presStyleIdx="5" presStyleCnt="10"/>
       <dgm:spPr/>
+      <dgm:t>
+        <a:bodyPr/>
+        <a:lstStyle/>
+        <a:p>
+          <a:endParaRPr lang="en-US"/>
+        </a:p>
+      </dgm:t>
     </dgm:pt>
     <dgm:pt modelId="{F6A40BF3-00AF-F14A-A22D-5C8B56F50956}" type="pres">
       <dgm:prSet presAssocID="{D19848FA-C9A2-434B-A708-EF1E865C7B6E}" presName="connectorText" presStyleLbl="sibTrans2D1" presStyleIdx="5" presStyleCnt="10"/>
       <dgm:spPr/>
+      <dgm:t>
+        <a:bodyPr/>
+        <a:lstStyle/>
+        <a:p>
+          <a:endParaRPr lang="en-US"/>
+        </a:p>
+      </dgm:t>
     </dgm:pt>
     <dgm:pt modelId="{9DE3DB86-0285-A849-8161-3C96DE0C7608}" type="pres">
       <dgm:prSet presAssocID="{EC1B55B6-C057-D74C-9041-07E907C76202}" presName="node" presStyleLbl="node1" presStyleIdx="6" presStyleCnt="11" custLinFactX="-40154" custLinFactNeighborX="-100000" custLinFactNeighborY="4632">
@@ -3158,10 +3283,24 @@
     <dgm:pt modelId="{34394282-55BC-F141-A3B0-616E337B99D1}" type="pres">
       <dgm:prSet presAssocID="{00849A85-2442-934A-8A25-B759498E4A62}" presName="sibTrans" presStyleLbl="sibTrans2D1" presStyleIdx="6" presStyleCnt="10"/>
       <dgm:spPr/>
+      <dgm:t>
+        <a:bodyPr/>
+        <a:lstStyle/>
+        <a:p>
+          <a:endParaRPr lang="en-US"/>
+        </a:p>
+      </dgm:t>
     </dgm:pt>
     <dgm:pt modelId="{7A2A5041-3D2C-4946-BF65-51F27CA7D3DF}" type="pres">
       <dgm:prSet presAssocID="{00849A85-2442-934A-8A25-B759498E4A62}" presName="connectorText" presStyleLbl="sibTrans2D1" presStyleIdx="6" presStyleCnt="10"/>
       <dgm:spPr/>
+      <dgm:t>
+        <a:bodyPr/>
+        <a:lstStyle/>
+        <a:p>
+          <a:endParaRPr lang="en-US"/>
+        </a:p>
+      </dgm:t>
     </dgm:pt>
     <dgm:pt modelId="{1F39E993-1E94-6341-B201-439C32FEBF5B}" type="pres">
       <dgm:prSet presAssocID="{23428979-A1AD-3049-BC3C-615D3FDD8DEC}" presName="node" presStyleLbl="node1" presStyleIdx="7" presStyleCnt="11" custLinFactX="-36190" custLinFactNeighborX="-100000" custLinFactNeighborY="6176">
@@ -3181,10 +3320,24 @@
     <dgm:pt modelId="{5821B350-EAB0-5340-9451-ECC501B044DA}" type="pres">
       <dgm:prSet presAssocID="{9792CB14-D5E2-B740-9A71-BA2AEFA83615}" presName="sibTrans" presStyleLbl="sibTrans2D1" presStyleIdx="7" presStyleCnt="10"/>
       <dgm:spPr/>
+      <dgm:t>
+        <a:bodyPr/>
+        <a:lstStyle/>
+        <a:p>
+          <a:endParaRPr lang="en-US"/>
+        </a:p>
+      </dgm:t>
     </dgm:pt>
     <dgm:pt modelId="{796EEB16-3280-7649-B562-F014A0541C43}" type="pres">
       <dgm:prSet presAssocID="{9792CB14-D5E2-B740-9A71-BA2AEFA83615}" presName="connectorText" presStyleLbl="sibTrans2D1" presStyleIdx="7" presStyleCnt="10"/>
       <dgm:spPr/>
+      <dgm:t>
+        <a:bodyPr/>
+        <a:lstStyle/>
+        <a:p>
+          <a:endParaRPr lang="en-US"/>
+        </a:p>
+      </dgm:t>
     </dgm:pt>
     <dgm:pt modelId="{9769ECA5-076F-E244-B85C-494555CCB762}" type="pres">
       <dgm:prSet presAssocID="{58DA7B2F-0AE0-9149-BDBB-44180705219F}" presName="node" presStyleLbl="node1" presStyleIdx="8" presStyleCnt="11" custLinFactY="51322" custLinFactNeighborX="8338" custLinFactNeighborY="100000">
@@ -3204,10 +3357,24 @@
     <dgm:pt modelId="{C2FC7C2F-6EEA-F445-BDC2-C4F5C2573CB6}" type="pres">
       <dgm:prSet presAssocID="{E6251A7D-5B35-2046-BE21-CB6C64B5A0EB}" presName="sibTrans" presStyleLbl="sibTrans2D1" presStyleIdx="8" presStyleCnt="10"/>
       <dgm:spPr/>
+      <dgm:t>
+        <a:bodyPr/>
+        <a:lstStyle/>
+        <a:p>
+          <a:endParaRPr lang="en-US"/>
+        </a:p>
+      </dgm:t>
     </dgm:pt>
     <dgm:pt modelId="{BD164B51-9CE3-D040-9951-0CB220B49EB9}" type="pres">
       <dgm:prSet presAssocID="{E6251A7D-5B35-2046-BE21-CB6C64B5A0EB}" presName="connectorText" presStyleLbl="sibTrans2D1" presStyleIdx="8" presStyleCnt="10"/>
       <dgm:spPr/>
+      <dgm:t>
+        <a:bodyPr/>
+        <a:lstStyle/>
+        <a:p>
+          <a:endParaRPr lang="en-US"/>
+        </a:p>
+      </dgm:t>
     </dgm:pt>
     <dgm:pt modelId="{E982B981-8AA8-AD42-8D2B-6F18F70DAAB2}" type="pres">
       <dgm:prSet presAssocID="{5E976085-F386-1A47-8335-5EBCA50C089B}" presName="node" presStyleLbl="node1" presStyleIdx="9" presStyleCnt="11" custLinFactX="100000" custLinFactY="55954" custLinFactNeighborX="179846" custLinFactNeighborY="100000">
@@ -3216,14 +3383,35 @@
         </dgm:presLayoutVars>
       </dgm:prSet>
       <dgm:spPr/>
+      <dgm:t>
+        <a:bodyPr/>
+        <a:lstStyle/>
+        <a:p>
+          <a:endParaRPr lang="en-US"/>
+        </a:p>
+      </dgm:t>
     </dgm:pt>
     <dgm:pt modelId="{292071F7-B9B4-064A-A0FC-C8F6FFC03581}" type="pres">
       <dgm:prSet presAssocID="{9A6A8D4F-D4BF-2D4F-A429-2FCA3DD3F17E}" presName="sibTrans" presStyleLbl="sibTrans2D1" presStyleIdx="9" presStyleCnt="10"/>
       <dgm:spPr/>
+      <dgm:t>
+        <a:bodyPr/>
+        <a:lstStyle/>
+        <a:p>
+          <a:endParaRPr lang="en-US"/>
+        </a:p>
+      </dgm:t>
     </dgm:pt>
     <dgm:pt modelId="{FF8A9451-803A-BF43-B898-EA10C246EACC}" type="pres">
       <dgm:prSet presAssocID="{9A6A8D4F-D4BF-2D4F-A429-2FCA3DD3F17E}" presName="connectorText" presStyleLbl="sibTrans2D1" presStyleIdx="9" presStyleCnt="10"/>
       <dgm:spPr/>
+      <dgm:t>
+        <a:bodyPr/>
+        <a:lstStyle/>
+        <a:p>
+          <a:endParaRPr lang="en-US"/>
+        </a:p>
+      </dgm:t>
     </dgm:pt>
     <dgm:pt modelId="{251F8A16-DD93-AC4A-8583-1113BC17AE79}" type="pres">
       <dgm:prSet presAssocID="{E7189776-D4D0-BF49-9A00-A7E6F0765C7D}" presName="node" presStyleLbl="node1" presStyleIdx="10" presStyleCnt="11" custLinFactX="200000" custLinFactNeighborX="221539" custLinFactNeighborY="-9265">
@@ -3232,6 +3420,13 @@
         </dgm:presLayoutVars>
       </dgm:prSet>
       <dgm:spPr/>
+      <dgm:t>
+        <a:bodyPr/>
+        <a:lstStyle/>
+        <a:p>
+          <a:endParaRPr lang="en-US"/>
+        </a:p>
+      </dgm:t>
     </dgm:pt>
   </dgm:ptLst>
   <dgm:cxnLst>
@@ -3259,16 +3454,16 @@
     <dgm:cxn modelId="{83C4BE5C-46C0-E046-980E-BD137AF14198}" type="presOf" srcId="{710A75B3-FF32-294D-AAB2-6303F19C0F38}" destId="{295D751B-A105-EE42-9529-A46FA718FD65}" srcOrd="1" destOrd="0" presId="urn:microsoft.com/office/officeart/2005/8/layout/process5"/>
     <dgm:cxn modelId="{652C86E1-E770-2642-8B12-331D80102D28}" srcId="{3BC6C5D5-F487-8045-BDA7-A5C5A96E9BDB}" destId="{EC1B55B6-C057-D74C-9041-07E907C76202}" srcOrd="6" destOrd="0" parTransId="{0B8FB2D8-441E-B54B-8821-B2EEE99FBB8B}" sibTransId="{00849A85-2442-934A-8A25-B759498E4A62}"/>
     <dgm:cxn modelId="{4B5039A4-3188-C54E-B24F-FF50AC46BFFA}" type="presOf" srcId="{58DA7B2F-0AE0-9149-BDBB-44180705219F}" destId="{9769ECA5-076F-E244-B85C-494555CCB762}" srcOrd="0" destOrd="0" presId="urn:microsoft.com/office/officeart/2005/8/layout/process5"/>
-    <dgm:cxn modelId="{DC8F68C6-E7DA-134C-94E8-E250867C8D68}" type="presOf" srcId="{9792CB14-D5E2-B740-9A71-BA2AEFA83615}" destId="{5821B350-EAB0-5340-9451-ECC501B044DA}" srcOrd="0" destOrd="0" presId="urn:microsoft.com/office/officeart/2005/8/layout/process5"/>
     <dgm:cxn modelId="{DC84104F-B1D9-494C-96A1-05C4A6B4F947}" type="presOf" srcId="{E7189776-D4D0-BF49-9A00-A7E6F0765C7D}" destId="{251F8A16-DD93-AC4A-8583-1113BC17AE79}" srcOrd="0" destOrd="0" presId="urn:microsoft.com/office/officeart/2005/8/layout/process5"/>
     <dgm:cxn modelId="{62F5BB5D-1BF0-9049-B781-3BDC46A95FC3}" type="presOf" srcId="{00849A85-2442-934A-8A25-B759498E4A62}" destId="{7A2A5041-3D2C-4946-BF65-51F27CA7D3DF}" srcOrd="1" destOrd="0" presId="urn:microsoft.com/office/officeart/2005/8/layout/process5"/>
+    <dgm:cxn modelId="{DC8F68C6-E7DA-134C-94E8-E250867C8D68}" type="presOf" srcId="{9792CB14-D5E2-B740-9A71-BA2AEFA83615}" destId="{5821B350-EAB0-5340-9451-ECC501B044DA}" srcOrd="0" destOrd="0" presId="urn:microsoft.com/office/officeart/2005/8/layout/process5"/>
     <dgm:cxn modelId="{475FA6EB-6BCB-D449-BC2B-43B37E1C73DE}" type="presOf" srcId="{AD22A924-6B6E-9742-BB1E-ED7D164971C2}" destId="{E57F80F9-44F8-DC49-8E95-3BBC0D03F1ED}" srcOrd="0" destOrd="0" presId="urn:microsoft.com/office/officeart/2005/8/layout/process5"/>
     <dgm:cxn modelId="{19B0C03A-1D14-0347-84F3-5966AE2C35DB}" type="presOf" srcId="{9792CB14-D5E2-B740-9A71-BA2AEFA83615}" destId="{796EEB16-3280-7649-B562-F014A0541C43}" srcOrd="1" destOrd="0" presId="urn:microsoft.com/office/officeart/2005/8/layout/process5"/>
     <dgm:cxn modelId="{ECA3A47C-FBF5-2C45-8AB2-93572C829569}" type="presOf" srcId="{E6251A7D-5B35-2046-BE21-CB6C64B5A0EB}" destId="{BD164B51-9CE3-D040-9951-0CB220B49EB9}" srcOrd="1" destOrd="0" presId="urn:microsoft.com/office/officeart/2005/8/layout/process5"/>
     <dgm:cxn modelId="{1E8BF264-957D-0847-BDE7-0C4F3AF25FA1}" srcId="{3BC6C5D5-F487-8045-BDA7-A5C5A96E9BDB}" destId="{5E976085-F386-1A47-8335-5EBCA50C089B}" srcOrd="9" destOrd="0" parTransId="{2912CFCA-7050-704A-B577-35BDD2FE8EC7}" sibTransId="{9A6A8D4F-D4BF-2D4F-A429-2FCA3DD3F17E}"/>
     <dgm:cxn modelId="{748CD9CC-AAD9-1644-B9CE-0F88B92308E9}" type="presOf" srcId="{E6251A7D-5B35-2046-BE21-CB6C64B5A0EB}" destId="{C2FC7C2F-6EEA-F445-BDC2-C4F5C2573CB6}" srcOrd="0" destOrd="0" presId="urn:microsoft.com/office/officeart/2005/8/layout/process5"/>
+    <dgm:cxn modelId="{196D6E2B-B230-804E-953A-AA46701955DB}" type="presOf" srcId="{9A6A8D4F-D4BF-2D4F-A429-2FCA3DD3F17E}" destId="{FF8A9451-803A-BF43-B898-EA10C246EACC}" srcOrd="1" destOrd="0" presId="urn:microsoft.com/office/officeart/2005/8/layout/process5"/>
     <dgm:cxn modelId="{5BFC17CD-E25B-0241-9666-BA9457D107FA}" srcId="{3BC6C5D5-F487-8045-BDA7-A5C5A96E9BDB}" destId="{E45F3AD5-D2F4-D94E-90B2-7AA9F030172E}" srcOrd="2" destOrd="0" parTransId="{8ED71A73-6E8B-7D4A-9396-F7D93C034F66}" sibTransId="{710A75B3-FF32-294D-AAB2-6303F19C0F38}"/>
-    <dgm:cxn modelId="{196D6E2B-B230-804E-953A-AA46701955DB}" type="presOf" srcId="{9A6A8D4F-D4BF-2D4F-A429-2FCA3DD3F17E}" destId="{FF8A9451-803A-BF43-B898-EA10C246EACC}" srcOrd="1" destOrd="0" presId="urn:microsoft.com/office/officeart/2005/8/layout/process5"/>
     <dgm:cxn modelId="{635901A0-D8D2-FA48-9DA9-466C04BA06C9}" type="presOf" srcId="{5E976085-F386-1A47-8335-5EBCA50C089B}" destId="{E982B981-8AA8-AD42-8D2B-6F18F70DAAB2}" srcOrd="0" destOrd="0" presId="urn:microsoft.com/office/officeart/2005/8/layout/process5"/>
     <dgm:cxn modelId="{60BC6A2C-A5F5-B042-996F-F90BA86C51EB}" srcId="{3BC6C5D5-F487-8045-BDA7-A5C5A96E9BDB}" destId="{23428979-A1AD-3049-BC3C-615D3FDD8DEC}" srcOrd="7" destOrd="0" parTransId="{E73FC1F0-486D-3646-96D8-F1FA866EC9E7}" sibTransId="{9792CB14-D5E2-B740-9A71-BA2AEFA83615}"/>
     <dgm:cxn modelId="{283DDB57-5D14-3245-9298-1881F9C24CE4}" srcId="{3BC6C5D5-F487-8045-BDA7-A5C5A96E9BDB}" destId="{AD22A924-6B6E-9742-BB1E-ED7D164971C2}" srcOrd="0" destOrd="0" parTransId="{0D3E19D8-E369-1648-84D3-D98100398B84}" sibTransId="{F07EFE35-C7D6-2F4A-ACE1-852E8BCC27F8}"/>
@@ -3989,14 +4184,35 @@
         </dgm:presLayoutVars>
       </dgm:prSet>
       <dgm:spPr/>
+      <dgm:t>
+        <a:bodyPr/>
+        <a:lstStyle/>
+        <a:p>
+          <a:endParaRPr lang="en-US"/>
+        </a:p>
+      </dgm:t>
     </dgm:pt>
     <dgm:pt modelId="{2E4DDA71-63BB-094D-AC2D-4AB8D484B16E}" type="pres">
       <dgm:prSet presAssocID="{F07EFE35-C7D6-2F4A-ACE1-852E8BCC27F8}" presName="sibTrans" presStyleLbl="sibTrans2D1" presStyleIdx="0" presStyleCnt="10"/>
       <dgm:spPr/>
+      <dgm:t>
+        <a:bodyPr/>
+        <a:lstStyle/>
+        <a:p>
+          <a:endParaRPr lang="en-US"/>
+        </a:p>
+      </dgm:t>
     </dgm:pt>
     <dgm:pt modelId="{8E6A274D-A0FE-1D4C-93E4-8B82CE196E3B}" type="pres">
       <dgm:prSet presAssocID="{F07EFE35-C7D6-2F4A-ACE1-852E8BCC27F8}" presName="connectorText" presStyleLbl="sibTrans2D1" presStyleIdx="0" presStyleCnt="10"/>
       <dgm:spPr/>
+      <dgm:t>
+        <a:bodyPr/>
+        <a:lstStyle/>
+        <a:p>
+          <a:endParaRPr lang="en-US"/>
+        </a:p>
+      </dgm:t>
     </dgm:pt>
     <dgm:pt modelId="{1C485498-7FB6-E049-B09F-F628CDE14F70}" type="pres">
       <dgm:prSet presAssocID="{D08C936B-7EA2-5E4D-8C40-D57C0BDF2402}" presName="node" presStyleLbl="node1" presStyleIdx="1" presStyleCnt="11" custLinFactX="39846" custLinFactNeighborX="100000" custLinFactNeighborY="23162">
@@ -4005,14 +4221,35 @@
         </dgm:presLayoutVars>
       </dgm:prSet>
       <dgm:spPr/>
+      <dgm:t>
+        <a:bodyPr/>
+        <a:lstStyle/>
+        <a:p>
+          <a:endParaRPr lang="en-US"/>
+        </a:p>
+      </dgm:t>
     </dgm:pt>
     <dgm:pt modelId="{7F931FB3-A9BA-174F-9128-E3CB763512CF}" type="pres">
       <dgm:prSet presAssocID="{327C20B1-0843-CE4C-8F29-D979A5FC89AD}" presName="sibTrans" presStyleLbl="sibTrans2D1" presStyleIdx="1" presStyleCnt="10"/>
       <dgm:spPr/>
+      <dgm:t>
+        <a:bodyPr/>
+        <a:lstStyle/>
+        <a:p>
+          <a:endParaRPr lang="en-US"/>
+        </a:p>
+      </dgm:t>
     </dgm:pt>
     <dgm:pt modelId="{D950472B-4AF5-914A-83A6-61A893741A8F}" type="pres">
       <dgm:prSet presAssocID="{327C20B1-0843-CE4C-8F29-D979A5FC89AD}" presName="connectorText" presStyleLbl="sibTrans2D1" presStyleIdx="1" presStyleCnt="10"/>
       <dgm:spPr/>
+      <dgm:t>
+        <a:bodyPr/>
+        <a:lstStyle/>
+        <a:p>
+          <a:endParaRPr lang="en-US"/>
+        </a:p>
+      </dgm:t>
     </dgm:pt>
     <dgm:pt modelId="{B525638F-6600-2B44-8009-0472B2361A11}" type="pres">
       <dgm:prSet presAssocID="{E45F3AD5-D2F4-D94E-90B2-7AA9F030172E}" presName="node" presStyleLbl="node1" presStyleIdx="2" presStyleCnt="11" custLinFactX="40822" custLinFactNeighborX="100000" custLinFactNeighborY="23162">
@@ -4021,14 +4258,35 @@
         </dgm:presLayoutVars>
       </dgm:prSet>
       <dgm:spPr/>
+      <dgm:t>
+        <a:bodyPr/>
+        <a:lstStyle/>
+        <a:p>
+          <a:endParaRPr lang="en-US"/>
+        </a:p>
+      </dgm:t>
     </dgm:pt>
     <dgm:pt modelId="{21984D2B-C062-F042-A872-A2D9A22C4D0C}" type="pres">
       <dgm:prSet presAssocID="{710A75B3-FF32-294D-AAB2-6303F19C0F38}" presName="sibTrans" presStyleLbl="sibTrans2D1" presStyleIdx="2" presStyleCnt="10"/>
       <dgm:spPr/>
+      <dgm:t>
+        <a:bodyPr/>
+        <a:lstStyle/>
+        <a:p>
+          <a:endParaRPr lang="en-US"/>
+        </a:p>
+      </dgm:t>
     </dgm:pt>
     <dgm:pt modelId="{295D751B-A105-EE42-9529-A46FA718FD65}" type="pres">
       <dgm:prSet presAssocID="{710A75B3-FF32-294D-AAB2-6303F19C0F38}" presName="connectorText" presStyleLbl="sibTrans2D1" presStyleIdx="2" presStyleCnt="10"/>
       <dgm:spPr/>
+      <dgm:t>
+        <a:bodyPr/>
+        <a:lstStyle/>
+        <a:p>
+          <a:endParaRPr lang="en-US"/>
+        </a:p>
+      </dgm:t>
     </dgm:pt>
     <dgm:pt modelId="{607ED82F-0153-9648-85A9-FD2598ED9CD4}" type="pres">
       <dgm:prSet presAssocID="{0C5C60D5-67E7-1447-9645-12655641CA4D}" presName="node" presStyleLbl="node1" presStyleIdx="3" presStyleCnt="11" custLinFactX="40823" custLinFactNeighborX="100000" custLinFactNeighborY="23162">
@@ -4037,14 +4295,35 @@
         </dgm:presLayoutVars>
       </dgm:prSet>
       <dgm:spPr/>
+      <dgm:t>
+        <a:bodyPr/>
+        <a:lstStyle/>
+        <a:p>
+          <a:endParaRPr lang="en-US"/>
+        </a:p>
+      </dgm:t>
     </dgm:pt>
     <dgm:pt modelId="{36F3A529-E509-4D46-8931-0B81FC1641D8}" type="pres">
       <dgm:prSet presAssocID="{274E1360-4211-6C46-B995-93610EBD938A}" presName="sibTrans" presStyleLbl="sibTrans2D1" presStyleIdx="3" presStyleCnt="10"/>
       <dgm:spPr/>
+      <dgm:t>
+        <a:bodyPr/>
+        <a:lstStyle/>
+        <a:p>
+          <a:endParaRPr lang="en-US"/>
+        </a:p>
+      </dgm:t>
     </dgm:pt>
     <dgm:pt modelId="{0F63130F-B27E-3241-99EB-836E0E0D4300}" type="pres">
       <dgm:prSet presAssocID="{274E1360-4211-6C46-B995-93610EBD938A}" presName="connectorText" presStyleLbl="sibTrans2D1" presStyleIdx="3" presStyleCnt="10"/>
       <dgm:spPr/>
+      <dgm:t>
+        <a:bodyPr/>
+        <a:lstStyle/>
+        <a:p>
+          <a:endParaRPr lang="en-US"/>
+        </a:p>
+      </dgm:t>
     </dgm:pt>
     <dgm:pt modelId="{9CDCDBFC-89AE-7742-BA04-469CA2CB8838}" type="pres">
       <dgm:prSet presAssocID="{F711D389-95A5-144D-A8A1-4ABDD989C0D7}" presName="node" presStyleLbl="node1" presStyleIdx="4" presStyleCnt="11" custLinFactY="80660" custLinFactNeighborX="2780" custLinFactNeighborY="100000">
@@ -4053,14 +4332,35 @@
         </dgm:presLayoutVars>
       </dgm:prSet>
       <dgm:spPr/>
+      <dgm:t>
+        <a:bodyPr/>
+        <a:lstStyle/>
+        <a:p>
+          <a:endParaRPr lang="en-US"/>
+        </a:p>
+      </dgm:t>
     </dgm:pt>
     <dgm:pt modelId="{20955F39-7A33-6145-AED8-600523AC68A6}" type="pres">
       <dgm:prSet presAssocID="{1F23692B-FE4B-E74F-8AE3-0C70656CDDEB}" presName="sibTrans" presStyleLbl="sibTrans2D1" presStyleIdx="4" presStyleCnt="10"/>
       <dgm:spPr/>
+      <dgm:t>
+        <a:bodyPr/>
+        <a:lstStyle/>
+        <a:p>
+          <a:endParaRPr lang="en-US"/>
+        </a:p>
+      </dgm:t>
     </dgm:pt>
     <dgm:pt modelId="{6E7E466E-B2C1-0E48-B811-BF510FAE457A}" type="pres">
       <dgm:prSet presAssocID="{1F23692B-FE4B-E74F-8AE3-0C70656CDDEB}" presName="connectorText" presStyleLbl="sibTrans2D1" presStyleIdx="4" presStyleCnt="10"/>
       <dgm:spPr/>
+      <dgm:t>
+        <a:bodyPr/>
+        <a:lstStyle/>
+        <a:p>
+          <a:endParaRPr lang="en-US"/>
+        </a:p>
+      </dgm:t>
     </dgm:pt>
     <dgm:pt modelId="{6FA43795-8FB5-1D4D-8051-02A937C5DB7C}" type="pres">
       <dgm:prSet presAssocID="{05414E78-B7A0-BE4D-9B45-C65E0397D141}" presName="node" presStyleLbl="node1" presStyleIdx="5" presStyleCnt="11" custLinFactX="-37116" custLinFactNeighborX="-100000" custLinFactNeighborY="13897">
@@ -4080,10 +4380,24 @@
     <dgm:pt modelId="{F401399D-B947-3642-BA1A-919842D84B49}" type="pres">
       <dgm:prSet presAssocID="{D19848FA-C9A2-434B-A708-EF1E865C7B6E}" presName="sibTrans" presStyleLbl="sibTrans2D1" presStyleIdx="5" presStyleCnt="10"/>
       <dgm:spPr/>
+      <dgm:t>
+        <a:bodyPr/>
+        <a:lstStyle/>
+        <a:p>
+          <a:endParaRPr lang="en-US"/>
+        </a:p>
+      </dgm:t>
     </dgm:pt>
     <dgm:pt modelId="{F6A40BF3-00AF-F14A-A22D-5C8B56F50956}" type="pres">
       <dgm:prSet presAssocID="{D19848FA-C9A2-434B-A708-EF1E865C7B6E}" presName="connectorText" presStyleLbl="sibTrans2D1" presStyleIdx="5" presStyleCnt="10"/>
       <dgm:spPr/>
+      <dgm:t>
+        <a:bodyPr/>
+        <a:lstStyle/>
+        <a:p>
+          <a:endParaRPr lang="en-US"/>
+        </a:p>
+      </dgm:t>
     </dgm:pt>
     <dgm:pt modelId="{9DE3DB86-0285-A849-8161-3C96DE0C7608}" type="pres">
       <dgm:prSet presAssocID="{EC1B55B6-C057-D74C-9041-07E907C76202}" presName="node" presStyleLbl="node1" presStyleIdx="6" presStyleCnt="11" custLinFactX="-40154" custLinFactNeighborX="-100000" custLinFactNeighborY="4632">
@@ -4103,10 +4417,24 @@
     <dgm:pt modelId="{34394282-55BC-F141-A3B0-616E337B99D1}" type="pres">
       <dgm:prSet presAssocID="{00849A85-2442-934A-8A25-B759498E4A62}" presName="sibTrans" presStyleLbl="sibTrans2D1" presStyleIdx="6" presStyleCnt="10"/>
       <dgm:spPr/>
+      <dgm:t>
+        <a:bodyPr/>
+        <a:lstStyle/>
+        <a:p>
+          <a:endParaRPr lang="en-US"/>
+        </a:p>
+      </dgm:t>
     </dgm:pt>
     <dgm:pt modelId="{7A2A5041-3D2C-4946-BF65-51F27CA7D3DF}" type="pres">
       <dgm:prSet presAssocID="{00849A85-2442-934A-8A25-B759498E4A62}" presName="connectorText" presStyleLbl="sibTrans2D1" presStyleIdx="6" presStyleCnt="10"/>
       <dgm:spPr/>
+      <dgm:t>
+        <a:bodyPr/>
+        <a:lstStyle/>
+        <a:p>
+          <a:endParaRPr lang="en-US"/>
+        </a:p>
+      </dgm:t>
     </dgm:pt>
     <dgm:pt modelId="{1F39E993-1E94-6341-B201-439C32FEBF5B}" type="pres">
       <dgm:prSet presAssocID="{23428979-A1AD-3049-BC3C-615D3FDD8DEC}" presName="node" presStyleLbl="node1" presStyleIdx="7" presStyleCnt="11" custLinFactX="-36190" custLinFactNeighborX="-100000" custLinFactNeighborY="6176">
@@ -4126,10 +4454,24 @@
     <dgm:pt modelId="{5821B350-EAB0-5340-9451-ECC501B044DA}" type="pres">
       <dgm:prSet presAssocID="{9792CB14-D5E2-B740-9A71-BA2AEFA83615}" presName="sibTrans" presStyleLbl="sibTrans2D1" presStyleIdx="7" presStyleCnt="10"/>
       <dgm:spPr/>
+      <dgm:t>
+        <a:bodyPr/>
+        <a:lstStyle/>
+        <a:p>
+          <a:endParaRPr lang="en-US"/>
+        </a:p>
+      </dgm:t>
     </dgm:pt>
     <dgm:pt modelId="{796EEB16-3280-7649-B562-F014A0541C43}" type="pres">
       <dgm:prSet presAssocID="{9792CB14-D5E2-B740-9A71-BA2AEFA83615}" presName="connectorText" presStyleLbl="sibTrans2D1" presStyleIdx="7" presStyleCnt="10"/>
       <dgm:spPr/>
+      <dgm:t>
+        <a:bodyPr/>
+        <a:lstStyle/>
+        <a:p>
+          <a:endParaRPr lang="en-US"/>
+        </a:p>
+      </dgm:t>
     </dgm:pt>
     <dgm:pt modelId="{9769ECA5-076F-E244-B85C-494555CCB762}" type="pres">
       <dgm:prSet presAssocID="{58DA7B2F-0AE0-9149-BDBB-44180705219F}" presName="node" presStyleLbl="node1" presStyleIdx="8" presStyleCnt="11" custLinFactY="51322" custLinFactNeighborX="8338" custLinFactNeighborY="100000">
@@ -4149,10 +4491,24 @@
     <dgm:pt modelId="{C2FC7C2F-6EEA-F445-BDC2-C4F5C2573CB6}" type="pres">
       <dgm:prSet presAssocID="{E6251A7D-5B35-2046-BE21-CB6C64B5A0EB}" presName="sibTrans" presStyleLbl="sibTrans2D1" presStyleIdx="8" presStyleCnt="10"/>
       <dgm:spPr/>
+      <dgm:t>
+        <a:bodyPr/>
+        <a:lstStyle/>
+        <a:p>
+          <a:endParaRPr lang="en-US"/>
+        </a:p>
+      </dgm:t>
     </dgm:pt>
     <dgm:pt modelId="{BD164B51-9CE3-D040-9951-0CB220B49EB9}" type="pres">
       <dgm:prSet presAssocID="{E6251A7D-5B35-2046-BE21-CB6C64B5A0EB}" presName="connectorText" presStyleLbl="sibTrans2D1" presStyleIdx="8" presStyleCnt="10"/>
       <dgm:spPr/>
+      <dgm:t>
+        <a:bodyPr/>
+        <a:lstStyle/>
+        <a:p>
+          <a:endParaRPr lang="en-US"/>
+        </a:p>
+      </dgm:t>
     </dgm:pt>
     <dgm:pt modelId="{E982B981-8AA8-AD42-8D2B-6F18F70DAAB2}" type="pres">
       <dgm:prSet presAssocID="{5E976085-F386-1A47-8335-5EBCA50C089B}" presName="node" presStyleLbl="node1" presStyleIdx="9" presStyleCnt="11" custLinFactX="100000" custLinFactY="55954" custLinFactNeighborX="179846" custLinFactNeighborY="100000">
@@ -4161,14 +4517,35 @@
         </dgm:presLayoutVars>
       </dgm:prSet>
       <dgm:spPr/>
+      <dgm:t>
+        <a:bodyPr/>
+        <a:lstStyle/>
+        <a:p>
+          <a:endParaRPr lang="en-US"/>
+        </a:p>
+      </dgm:t>
     </dgm:pt>
     <dgm:pt modelId="{292071F7-B9B4-064A-A0FC-C8F6FFC03581}" type="pres">
       <dgm:prSet presAssocID="{9A6A8D4F-D4BF-2D4F-A429-2FCA3DD3F17E}" presName="sibTrans" presStyleLbl="sibTrans2D1" presStyleIdx="9" presStyleCnt="10"/>
       <dgm:spPr/>
+      <dgm:t>
+        <a:bodyPr/>
+        <a:lstStyle/>
+        <a:p>
+          <a:endParaRPr lang="en-US"/>
+        </a:p>
+      </dgm:t>
     </dgm:pt>
     <dgm:pt modelId="{FF8A9451-803A-BF43-B898-EA10C246EACC}" type="pres">
       <dgm:prSet presAssocID="{9A6A8D4F-D4BF-2D4F-A429-2FCA3DD3F17E}" presName="connectorText" presStyleLbl="sibTrans2D1" presStyleIdx="9" presStyleCnt="10"/>
       <dgm:spPr/>
+      <dgm:t>
+        <a:bodyPr/>
+        <a:lstStyle/>
+        <a:p>
+          <a:endParaRPr lang="en-US"/>
+        </a:p>
+      </dgm:t>
     </dgm:pt>
     <dgm:pt modelId="{251F8A16-DD93-AC4A-8583-1113BC17AE79}" type="pres">
       <dgm:prSet presAssocID="{E7189776-D4D0-BF49-9A00-A7E6F0765C7D}" presName="node" presStyleLbl="node1" presStyleIdx="10" presStyleCnt="11" custLinFactX="200000" custLinFactNeighborX="221539" custLinFactNeighborY="-9265">
@@ -4177,52 +4554,59 @@
         </dgm:presLayoutVars>
       </dgm:prSet>
       <dgm:spPr/>
+      <dgm:t>
+        <a:bodyPr/>
+        <a:lstStyle/>
+        <a:p>
+          <a:endParaRPr lang="en-US"/>
+        </a:p>
+      </dgm:t>
     </dgm:pt>
   </dgm:ptLst>
   <dgm:cxnLst>
-    <dgm:cxn modelId="{88460CFE-BC27-7E4B-BF0A-B1FEE68CA3AA}" srcId="{3BC6C5D5-F487-8045-BDA7-A5C5A96E9BDB}" destId="{0C5C60D5-67E7-1447-9645-12655641CA4D}" srcOrd="3" destOrd="0" parTransId="{0910A748-7B2C-F342-BD15-483C6C3BB3EA}" sibTransId="{274E1360-4211-6C46-B995-93610EBD938A}"/>
-    <dgm:cxn modelId="{09C80F85-8718-524B-B489-D6CC909227B6}" type="presOf" srcId="{327C20B1-0843-CE4C-8F29-D979A5FC89AD}" destId="{7F931FB3-A9BA-174F-9128-E3CB763512CF}" srcOrd="0" destOrd="0" presId="urn:microsoft.com/office/officeart/2005/8/layout/process5"/>
+    <dgm:cxn modelId="{F94A98C6-F826-F646-B563-EC46AE3F6D65}" type="presOf" srcId="{E6251A7D-5B35-2046-BE21-CB6C64B5A0EB}" destId="{BD164B51-9CE3-D040-9951-0CB220B49EB9}" srcOrd="1" destOrd="0" presId="urn:microsoft.com/office/officeart/2005/8/layout/process5"/>
+    <dgm:cxn modelId="{CA79F0F2-A028-CF4A-964C-4812C794E68F}" type="presOf" srcId="{23428979-A1AD-3049-BC3C-615D3FDD8DEC}" destId="{1F39E993-1E94-6341-B201-439C32FEBF5B}" srcOrd="0" destOrd="0" presId="urn:microsoft.com/office/officeart/2005/8/layout/process5"/>
+    <dgm:cxn modelId="{083F5193-3EC6-AF42-8091-9D587209547D}" type="presOf" srcId="{9792CB14-D5E2-B740-9A71-BA2AEFA83615}" destId="{5821B350-EAB0-5340-9451-ECC501B044DA}" srcOrd="0" destOrd="0" presId="urn:microsoft.com/office/officeart/2005/8/layout/process5"/>
+    <dgm:cxn modelId="{A9C48A65-B284-9C45-8E61-E06FA0E09308}" type="presOf" srcId="{E6251A7D-5B35-2046-BE21-CB6C64B5A0EB}" destId="{C2FC7C2F-6EEA-F445-BDC2-C4F5C2573CB6}" srcOrd="0" destOrd="0" presId="urn:microsoft.com/office/officeart/2005/8/layout/process5"/>
+    <dgm:cxn modelId="{086F941D-7DFB-014E-BA9C-32698370A00E}" type="presOf" srcId="{D19848FA-C9A2-434B-A708-EF1E865C7B6E}" destId="{F6A40BF3-00AF-F14A-A22D-5C8B56F50956}" srcOrd="1" destOrd="0" presId="urn:microsoft.com/office/officeart/2005/8/layout/process5"/>
+    <dgm:cxn modelId="{0FEBA622-7B46-CF4F-B015-21F6C983CF82}" type="presOf" srcId="{274E1360-4211-6C46-B995-93610EBD938A}" destId="{0F63130F-B27E-3241-99EB-836E0E0D4300}" srcOrd="1" destOrd="0" presId="urn:microsoft.com/office/officeart/2005/8/layout/process5"/>
+    <dgm:cxn modelId="{5CB4BD0B-8FBF-5D44-8A88-CF40AB2A36C9}" type="presOf" srcId="{9A6A8D4F-D4BF-2D4F-A429-2FCA3DD3F17E}" destId="{292071F7-B9B4-064A-A0FC-C8F6FFC03581}" srcOrd="0" destOrd="0" presId="urn:microsoft.com/office/officeart/2005/8/layout/process5"/>
+    <dgm:cxn modelId="{283DDB57-5D14-3245-9298-1881F9C24CE4}" srcId="{3BC6C5D5-F487-8045-BDA7-A5C5A96E9BDB}" destId="{AD22A924-6B6E-9742-BB1E-ED7D164971C2}" srcOrd="0" destOrd="0" parTransId="{0D3E19D8-E369-1648-84D3-D98100398B84}" sibTransId="{F07EFE35-C7D6-2F4A-ACE1-852E8BCC27F8}"/>
     <dgm:cxn modelId="{0322926B-4546-474C-8C07-926B2879D556}" type="presOf" srcId="{E7189776-D4D0-BF49-9A00-A7E6F0765C7D}" destId="{251F8A16-DD93-AC4A-8583-1113BC17AE79}" srcOrd="0" destOrd="0" presId="urn:microsoft.com/office/officeart/2005/8/layout/process5"/>
-    <dgm:cxn modelId="{B939283F-2A44-FA40-8D16-9AE6238879E8}" type="presOf" srcId="{F07EFE35-C7D6-2F4A-ACE1-852E8BCC27F8}" destId="{2E4DDA71-63BB-094D-AC2D-4AB8D484B16E}" srcOrd="0" destOrd="0" presId="urn:microsoft.com/office/officeart/2005/8/layout/process5"/>
-    <dgm:cxn modelId="{083F5193-3EC6-AF42-8091-9D587209547D}" type="presOf" srcId="{9792CB14-D5E2-B740-9A71-BA2AEFA83615}" destId="{5821B350-EAB0-5340-9451-ECC501B044DA}" srcOrd="0" destOrd="0" presId="urn:microsoft.com/office/officeart/2005/8/layout/process5"/>
     <dgm:cxn modelId="{119A9917-19CC-084B-86CF-24383871E626}" type="presOf" srcId="{F07EFE35-C7D6-2F4A-ACE1-852E8BCC27F8}" destId="{8E6A274D-A0FE-1D4C-93E4-8B82CE196E3B}" srcOrd="1" destOrd="0" presId="urn:microsoft.com/office/officeart/2005/8/layout/process5"/>
-    <dgm:cxn modelId="{9B350909-2702-FA4D-978C-0389B02A1356}" type="presOf" srcId="{05414E78-B7A0-BE4D-9B45-C65E0397D141}" destId="{6FA43795-8FB5-1D4D-8051-02A937C5DB7C}" srcOrd="0" destOrd="0" presId="urn:microsoft.com/office/officeart/2005/8/layout/process5"/>
-    <dgm:cxn modelId="{EC8BCE47-A3C4-4046-9F30-40301AE16258}" type="presOf" srcId="{9A6A8D4F-D4BF-2D4F-A429-2FCA3DD3F17E}" destId="{FF8A9451-803A-BF43-B898-EA10C246EACC}" srcOrd="1" destOrd="0" presId="urn:microsoft.com/office/officeart/2005/8/layout/process5"/>
-    <dgm:cxn modelId="{5C7C8847-301E-B84F-9C6E-D6E5E2403A88}" srcId="{3BC6C5D5-F487-8045-BDA7-A5C5A96E9BDB}" destId="{05414E78-B7A0-BE4D-9B45-C65E0397D141}" srcOrd="5" destOrd="0" parTransId="{2EDE19E9-67AF-2A4A-8C43-9F1F31D3DC30}" sibTransId="{D19848FA-C9A2-434B-A708-EF1E865C7B6E}"/>
     <dgm:cxn modelId="{0FDCA5FC-49C2-E54D-BEB9-61690CD0BF4B}" type="presOf" srcId="{D19848FA-C9A2-434B-A708-EF1E865C7B6E}" destId="{F401399D-B947-3642-BA1A-919842D84B49}" srcOrd="0" destOrd="0" presId="urn:microsoft.com/office/officeart/2005/8/layout/process5"/>
-    <dgm:cxn modelId="{B5C162A5-BFFD-654E-B78A-3CF99E373532}" srcId="{3BC6C5D5-F487-8045-BDA7-A5C5A96E9BDB}" destId="{E7189776-D4D0-BF49-9A00-A7E6F0765C7D}" srcOrd="10" destOrd="0" parTransId="{F55C5933-753F-1E48-8123-397B3D8E3C28}" sibTransId="{0D9C536B-0FE2-F447-A73C-38BA99725235}"/>
-    <dgm:cxn modelId="{BD179D53-8489-FA44-9CE0-A296134EB135}" type="presOf" srcId="{58DA7B2F-0AE0-9149-BDBB-44180705219F}" destId="{9769ECA5-076F-E244-B85C-494555CCB762}" srcOrd="0" destOrd="0" presId="urn:microsoft.com/office/officeart/2005/8/layout/process5"/>
-    <dgm:cxn modelId="{D16CA28D-ADCF-F649-821C-DF17185FEEBF}" type="presOf" srcId="{00849A85-2442-934A-8A25-B759498E4A62}" destId="{7A2A5041-3D2C-4946-BF65-51F27CA7D3DF}" srcOrd="1" destOrd="0" presId="urn:microsoft.com/office/officeart/2005/8/layout/process5"/>
-    <dgm:cxn modelId="{CA79F0F2-A028-CF4A-964C-4812C794E68F}" type="presOf" srcId="{23428979-A1AD-3049-BC3C-615D3FDD8DEC}" destId="{1F39E993-1E94-6341-B201-439C32FEBF5B}" srcOrd="0" destOrd="0" presId="urn:microsoft.com/office/officeart/2005/8/layout/process5"/>
-    <dgm:cxn modelId="{251E326D-0EAA-624D-9AC5-12F7F3003223}" type="presOf" srcId="{F711D389-95A5-144D-A8A1-4ABDD989C0D7}" destId="{9CDCDBFC-89AE-7742-BA04-469CA2CB8838}" srcOrd="0" destOrd="0" presId="urn:microsoft.com/office/officeart/2005/8/layout/process5"/>
-    <dgm:cxn modelId="{DCAEECBE-3747-4F4B-92D5-771EBB4F51ED}" type="presOf" srcId="{9792CB14-D5E2-B740-9A71-BA2AEFA83615}" destId="{796EEB16-3280-7649-B562-F014A0541C43}" srcOrd="1" destOrd="0" presId="urn:microsoft.com/office/officeart/2005/8/layout/process5"/>
-    <dgm:cxn modelId="{4326FCA2-94F7-5F44-8BF0-752A7BE18A90}" type="presOf" srcId="{00849A85-2442-934A-8A25-B759498E4A62}" destId="{34394282-55BC-F141-A3B0-616E337B99D1}" srcOrd="0" destOrd="0" presId="urn:microsoft.com/office/officeart/2005/8/layout/process5"/>
-    <dgm:cxn modelId="{5CD71776-665A-7541-8CC0-CD73028EAA18}" type="presOf" srcId="{EC1B55B6-C057-D74C-9041-07E907C76202}" destId="{9DE3DB86-0285-A849-8161-3C96DE0C7608}" srcOrd="0" destOrd="0" presId="urn:microsoft.com/office/officeart/2005/8/layout/process5"/>
-    <dgm:cxn modelId="{94982DE8-31E0-0C45-A4CD-E187DF8C037A}" type="presOf" srcId="{327C20B1-0843-CE4C-8F29-D979A5FC89AD}" destId="{D950472B-4AF5-914A-83A6-61A893741A8F}" srcOrd="1" destOrd="0" presId="urn:microsoft.com/office/officeart/2005/8/layout/process5"/>
-    <dgm:cxn modelId="{70A3563A-85B5-FE46-9E63-1D5A13EB3AC5}" type="presOf" srcId="{710A75B3-FF32-294D-AAB2-6303F19C0F38}" destId="{295D751B-A105-EE42-9529-A46FA718FD65}" srcOrd="1" destOrd="0" presId="urn:microsoft.com/office/officeart/2005/8/layout/process5"/>
-    <dgm:cxn modelId="{086F941D-7DFB-014E-BA9C-32698370A00E}" type="presOf" srcId="{D19848FA-C9A2-434B-A708-EF1E865C7B6E}" destId="{F6A40BF3-00AF-F14A-A22D-5C8B56F50956}" srcOrd="1" destOrd="0" presId="urn:microsoft.com/office/officeart/2005/8/layout/process5"/>
-    <dgm:cxn modelId="{5CB4BD0B-8FBF-5D44-8A88-CF40AB2A36C9}" type="presOf" srcId="{9A6A8D4F-D4BF-2D4F-A429-2FCA3DD3F17E}" destId="{292071F7-B9B4-064A-A0FC-C8F6FFC03581}" srcOrd="0" destOrd="0" presId="urn:microsoft.com/office/officeart/2005/8/layout/process5"/>
-    <dgm:cxn modelId="{652C86E1-E770-2642-8B12-331D80102D28}" srcId="{3BC6C5D5-F487-8045-BDA7-A5C5A96E9BDB}" destId="{EC1B55B6-C057-D74C-9041-07E907C76202}" srcOrd="6" destOrd="0" parTransId="{0B8FB2D8-441E-B54B-8821-B2EEE99FBB8B}" sibTransId="{00849A85-2442-934A-8A25-B759498E4A62}"/>
-    <dgm:cxn modelId="{1E2D2351-6F7B-6447-B8CF-1774336EFD0C}" type="presOf" srcId="{D08C936B-7EA2-5E4D-8C40-D57C0BDF2402}" destId="{1C485498-7FB6-E049-B09F-F628CDE14F70}" srcOrd="0" destOrd="0" presId="urn:microsoft.com/office/officeart/2005/8/layout/process5"/>
-    <dgm:cxn modelId="{9602F5CE-CD2C-D443-95FB-6C7DDCF00023}" type="presOf" srcId="{274E1360-4211-6C46-B995-93610EBD938A}" destId="{36F3A529-E509-4D46-8931-0B81FC1641D8}" srcOrd="0" destOrd="0" presId="urn:microsoft.com/office/officeart/2005/8/layout/process5"/>
-    <dgm:cxn modelId="{7DA223CA-2FD7-AB45-9C59-2A0852F7DB8E}" type="presOf" srcId="{0C5C60D5-67E7-1447-9645-12655641CA4D}" destId="{607ED82F-0153-9648-85A9-FD2598ED9CD4}" srcOrd="0" destOrd="0" presId="urn:microsoft.com/office/officeart/2005/8/layout/process5"/>
-    <dgm:cxn modelId="{746A837A-3A13-914A-AEC8-80DE4E25E033}" type="presOf" srcId="{5E976085-F386-1A47-8335-5EBCA50C089B}" destId="{E982B981-8AA8-AD42-8D2B-6F18F70DAAB2}" srcOrd="0" destOrd="0" presId="urn:microsoft.com/office/officeart/2005/8/layout/process5"/>
-    <dgm:cxn modelId="{AEC11228-608E-3740-83A9-62215C2F5FF8}" type="presOf" srcId="{AD22A924-6B6E-9742-BB1E-ED7D164971C2}" destId="{E57F80F9-44F8-DC49-8E95-3BBC0D03F1ED}" srcOrd="0" destOrd="0" presId="urn:microsoft.com/office/officeart/2005/8/layout/process5"/>
-    <dgm:cxn modelId="{64DDE025-422C-B943-A577-49019F18DCBC}" type="presOf" srcId="{E45F3AD5-D2F4-D94E-90B2-7AA9F030172E}" destId="{B525638F-6600-2B44-8009-0472B2361A11}" srcOrd="0" destOrd="0" presId="urn:microsoft.com/office/officeart/2005/8/layout/process5"/>
-    <dgm:cxn modelId="{A2A2C361-BDB4-1C40-9AA6-DC3A6F13C0ED}" type="presOf" srcId="{3BC6C5D5-F487-8045-BDA7-A5C5A96E9BDB}" destId="{3FFA31E3-DC05-3C47-B60E-8E2B7C077C03}" srcOrd="0" destOrd="0" presId="urn:microsoft.com/office/officeart/2005/8/layout/process5"/>
-    <dgm:cxn modelId="{3D3B1AC5-8F91-3145-931E-3D1E75F46F7D}" type="presOf" srcId="{1F23692B-FE4B-E74F-8AE3-0C70656CDDEB}" destId="{6E7E466E-B2C1-0E48-B811-BF510FAE457A}" srcOrd="1" destOrd="0" presId="urn:microsoft.com/office/officeart/2005/8/layout/process5"/>
+    <dgm:cxn modelId="{50ADE0DD-C7C9-B945-BA68-9E6EBA248104}" srcId="{3BC6C5D5-F487-8045-BDA7-A5C5A96E9BDB}" destId="{D08C936B-7EA2-5E4D-8C40-D57C0BDF2402}" srcOrd="1" destOrd="0" parTransId="{53887434-3C85-2348-9829-7BCCC0252D9A}" sibTransId="{327C20B1-0843-CE4C-8F29-D979A5FC89AD}"/>
     <dgm:cxn modelId="{1E8BF264-957D-0847-BDE7-0C4F3AF25FA1}" srcId="{3BC6C5D5-F487-8045-BDA7-A5C5A96E9BDB}" destId="{5E976085-F386-1A47-8335-5EBCA50C089B}" srcOrd="9" destOrd="0" parTransId="{2912CFCA-7050-704A-B577-35BDD2FE8EC7}" sibTransId="{9A6A8D4F-D4BF-2D4F-A429-2FCA3DD3F17E}"/>
     <dgm:cxn modelId="{5BFC17CD-E25B-0241-9666-BA9457D107FA}" srcId="{3BC6C5D5-F487-8045-BDA7-A5C5A96E9BDB}" destId="{E45F3AD5-D2F4-D94E-90B2-7AA9F030172E}" srcOrd="2" destOrd="0" parTransId="{8ED71A73-6E8B-7D4A-9396-F7D93C034F66}" sibTransId="{710A75B3-FF32-294D-AAB2-6303F19C0F38}"/>
-    <dgm:cxn modelId="{0FEBA622-7B46-CF4F-B015-21F6C983CF82}" type="presOf" srcId="{274E1360-4211-6C46-B995-93610EBD938A}" destId="{0F63130F-B27E-3241-99EB-836E0E0D4300}" srcOrd="1" destOrd="0" presId="urn:microsoft.com/office/officeart/2005/8/layout/process5"/>
+    <dgm:cxn modelId="{B5C162A5-BFFD-654E-B78A-3CF99E373532}" srcId="{3BC6C5D5-F487-8045-BDA7-A5C5A96E9BDB}" destId="{E7189776-D4D0-BF49-9A00-A7E6F0765C7D}" srcOrd="10" destOrd="0" parTransId="{F55C5933-753F-1E48-8123-397B3D8E3C28}" sibTransId="{0D9C536B-0FE2-F447-A73C-38BA99725235}"/>
+    <dgm:cxn modelId="{94982DE8-31E0-0C45-A4CD-E187DF8C037A}" type="presOf" srcId="{327C20B1-0843-CE4C-8F29-D979A5FC89AD}" destId="{D950472B-4AF5-914A-83A6-61A893741A8F}" srcOrd="1" destOrd="0" presId="urn:microsoft.com/office/officeart/2005/8/layout/process5"/>
+    <dgm:cxn modelId="{D16CA28D-ADCF-F649-821C-DF17185FEEBF}" type="presOf" srcId="{00849A85-2442-934A-8A25-B759498E4A62}" destId="{7A2A5041-3D2C-4946-BF65-51F27CA7D3DF}" srcOrd="1" destOrd="0" presId="urn:microsoft.com/office/officeart/2005/8/layout/process5"/>
+    <dgm:cxn modelId="{0640BE4E-0CD6-894E-8019-7D7EB20AB680}" srcId="{3BC6C5D5-F487-8045-BDA7-A5C5A96E9BDB}" destId="{F711D389-95A5-144D-A8A1-4ABDD989C0D7}" srcOrd="4" destOrd="0" parTransId="{12F5A045-1ED7-D14B-9FCA-477AA7EFC476}" sibTransId="{1F23692B-FE4B-E74F-8AE3-0C70656CDDEB}"/>
+    <dgm:cxn modelId="{9602F5CE-CD2C-D443-95FB-6C7DDCF00023}" type="presOf" srcId="{274E1360-4211-6C46-B995-93610EBD938A}" destId="{36F3A529-E509-4D46-8931-0B81FC1641D8}" srcOrd="0" destOrd="0" presId="urn:microsoft.com/office/officeart/2005/8/layout/process5"/>
+    <dgm:cxn modelId="{09C80F85-8718-524B-B489-D6CC909227B6}" type="presOf" srcId="{327C20B1-0843-CE4C-8F29-D979A5FC89AD}" destId="{7F931FB3-A9BA-174F-9128-E3CB763512CF}" srcOrd="0" destOrd="0" presId="urn:microsoft.com/office/officeart/2005/8/layout/process5"/>
+    <dgm:cxn modelId="{AEC11228-608E-3740-83A9-62215C2F5FF8}" type="presOf" srcId="{AD22A924-6B6E-9742-BB1E-ED7D164971C2}" destId="{E57F80F9-44F8-DC49-8E95-3BBC0D03F1ED}" srcOrd="0" destOrd="0" presId="urn:microsoft.com/office/officeart/2005/8/layout/process5"/>
+    <dgm:cxn modelId="{88460CFE-BC27-7E4B-BF0A-B1FEE68CA3AA}" srcId="{3BC6C5D5-F487-8045-BDA7-A5C5A96E9BDB}" destId="{0C5C60D5-67E7-1447-9645-12655641CA4D}" srcOrd="3" destOrd="0" parTransId="{0910A748-7B2C-F342-BD15-483C6C3BB3EA}" sibTransId="{274E1360-4211-6C46-B995-93610EBD938A}"/>
+    <dgm:cxn modelId="{DCAEECBE-3747-4F4B-92D5-771EBB4F51ED}" type="presOf" srcId="{9792CB14-D5E2-B740-9A71-BA2AEFA83615}" destId="{796EEB16-3280-7649-B562-F014A0541C43}" srcOrd="1" destOrd="0" presId="urn:microsoft.com/office/officeart/2005/8/layout/process5"/>
+    <dgm:cxn modelId="{F4158DE0-DCFE-CD45-97AE-1BA4468449AD}" srcId="{3BC6C5D5-F487-8045-BDA7-A5C5A96E9BDB}" destId="{58DA7B2F-0AE0-9149-BDBB-44180705219F}" srcOrd="8" destOrd="0" parTransId="{BC853DE1-8341-294B-BCEF-BB7ED1A6AE79}" sibTransId="{E6251A7D-5B35-2046-BE21-CB6C64B5A0EB}"/>
+    <dgm:cxn modelId="{1E2D2351-6F7B-6447-B8CF-1774336EFD0C}" type="presOf" srcId="{D08C936B-7EA2-5E4D-8C40-D57C0BDF2402}" destId="{1C485498-7FB6-E049-B09F-F628CDE14F70}" srcOrd="0" destOrd="0" presId="urn:microsoft.com/office/officeart/2005/8/layout/process5"/>
+    <dgm:cxn modelId="{7DA223CA-2FD7-AB45-9C59-2A0852F7DB8E}" type="presOf" srcId="{0C5C60D5-67E7-1447-9645-12655641CA4D}" destId="{607ED82F-0153-9648-85A9-FD2598ED9CD4}" srcOrd="0" destOrd="0" presId="urn:microsoft.com/office/officeart/2005/8/layout/process5"/>
+    <dgm:cxn modelId="{669DD56C-A4C4-3644-B631-2057334DBB08}" type="presOf" srcId="{710A75B3-FF32-294D-AAB2-6303F19C0F38}" destId="{21984D2B-C062-F042-A872-A2D9A22C4D0C}" srcOrd="0" destOrd="0" presId="urn:microsoft.com/office/officeart/2005/8/layout/process5"/>
+    <dgm:cxn modelId="{70A3563A-85B5-FE46-9E63-1D5A13EB3AC5}" type="presOf" srcId="{710A75B3-FF32-294D-AAB2-6303F19C0F38}" destId="{295D751B-A105-EE42-9529-A46FA718FD65}" srcOrd="1" destOrd="0" presId="urn:microsoft.com/office/officeart/2005/8/layout/process5"/>
+    <dgm:cxn modelId="{5C7C8847-301E-B84F-9C6E-D6E5E2403A88}" srcId="{3BC6C5D5-F487-8045-BDA7-A5C5A96E9BDB}" destId="{05414E78-B7A0-BE4D-9B45-C65E0397D141}" srcOrd="5" destOrd="0" parTransId="{2EDE19E9-67AF-2A4A-8C43-9F1F31D3DC30}" sibTransId="{D19848FA-C9A2-434B-A708-EF1E865C7B6E}"/>
+    <dgm:cxn modelId="{B939283F-2A44-FA40-8D16-9AE6238879E8}" type="presOf" srcId="{F07EFE35-C7D6-2F4A-ACE1-852E8BCC27F8}" destId="{2E4DDA71-63BB-094D-AC2D-4AB8D484B16E}" srcOrd="0" destOrd="0" presId="urn:microsoft.com/office/officeart/2005/8/layout/process5"/>
+    <dgm:cxn modelId="{652C86E1-E770-2642-8B12-331D80102D28}" srcId="{3BC6C5D5-F487-8045-BDA7-A5C5A96E9BDB}" destId="{EC1B55B6-C057-D74C-9041-07E907C76202}" srcOrd="6" destOrd="0" parTransId="{0B8FB2D8-441E-B54B-8821-B2EEE99FBB8B}" sibTransId="{00849A85-2442-934A-8A25-B759498E4A62}"/>
+    <dgm:cxn modelId="{64DDE025-422C-B943-A577-49019F18DCBC}" type="presOf" srcId="{E45F3AD5-D2F4-D94E-90B2-7AA9F030172E}" destId="{B525638F-6600-2B44-8009-0472B2361A11}" srcOrd="0" destOrd="0" presId="urn:microsoft.com/office/officeart/2005/8/layout/process5"/>
+    <dgm:cxn modelId="{EC8BCE47-A3C4-4046-9F30-40301AE16258}" type="presOf" srcId="{9A6A8D4F-D4BF-2D4F-A429-2FCA3DD3F17E}" destId="{FF8A9451-803A-BF43-B898-EA10C246EACC}" srcOrd="1" destOrd="0" presId="urn:microsoft.com/office/officeart/2005/8/layout/process5"/>
+    <dgm:cxn modelId="{3D3B1AC5-8F91-3145-931E-3D1E75F46F7D}" type="presOf" srcId="{1F23692B-FE4B-E74F-8AE3-0C70656CDDEB}" destId="{6E7E466E-B2C1-0E48-B811-BF510FAE457A}" srcOrd="1" destOrd="0" presId="urn:microsoft.com/office/officeart/2005/8/layout/process5"/>
+    <dgm:cxn modelId="{5CD71776-665A-7541-8CC0-CD73028EAA18}" type="presOf" srcId="{EC1B55B6-C057-D74C-9041-07E907C76202}" destId="{9DE3DB86-0285-A849-8161-3C96DE0C7608}" srcOrd="0" destOrd="0" presId="urn:microsoft.com/office/officeart/2005/8/layout/process5"/>
+    <dgm:cxn modelId="{4326FCA2-94F7-5F44-8BF0-752A7BE18A90}" type="presOf" srcId="{00849A85-2442-934A-8A25-B759498E4A62}" destId="{34394282-55BC-F141-A3B0-616E337B99D1}" srcOrd="0" destOrd="0" presId="urn:microsoft.com/office/officeart/2005/8/layout/process5"/>
+    <dgm:cxn modelId="{972B118A-C700-C345-A504-FE93A90783DC}" type="presOf" srcId="{1F23692B-FE4B-E74F-8AE3-0C70656CDDEB}" destId="{20955F39-7A33-6145-AED8-600523AC68A6}" srcOrd="0" destOrd="0" presId="urn:microsoft.com/office/officeart/2005/8/layout/process5"/>
+    <dgm:cxn modelId="{A2A2C361-BDB4-1C40-9AA6-DC3A6F13C0ED}" type="presOf" srcId="{3BC6C5D5-F487-8045-BDA7-A5C5A96E9BDB}" destId="{3FFA31E3-DC05-3C47-B60E-8E2B7C077C03}" srcOrd="0" destOrd="0" presId="urn:microsoft.com/office/officeart/2005/8/layout/process5"/>
+    <dgm:cxn modelId="{251E326D-0EAA-624D-9AC5-12F7F3003223}" type="presOf" srcId="{F711D389-95A5-144D-A8A1-4ABDD989C0D7}" destId="{9CDCDBFC-89AE-7742-BA04-469CA2CB8838}" srcOrd="0" destOrd="0" presId="urn:microsoft.com/office/officeart/2005/8/layout/process5"/>
+    <dgm:cxn modelId="{BD179D53-8489-FA44-9CE0-A296134EB135}" type="presOf" srcId="{58DA7B2F-0AE0-9149-BDBB-44180705219F}" destId="{9769ECA5-076F-E244-B85C-494555CCB762}" srcOrd="0" destOrd="0" presId="urn:microsoft.com/office/officeart/2005/8/layout/process5"/>
+    <dgm:cxn modelId="{746A837A-3A13-914A-AEC8-80DE4E25E033}" type="presOf" srcId="{5E976085-F386-1A47-8335-5EBCA50C089B}" destId="{E982B981-8AA8-AD42-8D2B-6F18F70DAAB2}" srcOrd="0" destOrd="0" presId="urn:microsoft.com/office/officeart/2005/8/layout/process5"/>
     <dgm:cxn modelId="{60BC6A2C-A5F5-B042-996F-F90BA86C51EB}" srcId="{3BC6C5D5-F487-8045-BDA7-A5C5A96E9BDB}" destId="{23428979-A1AD-3049-BC3C-615D3FDD8DEC}" srcOrd="7" destOrd="0" parTransId="{E73FC1F0-486D-3646-96D8-F1FA866EC9E7}" sibTransId="{9792CB14-D5E2-B740-9A71-BA2AEFA83615}"/>
-    <dgm:cxn modelId="{669DD56C-A4C4-3644-B631-2057334DBB08}" type="presOf" srcId="{710A75B3-FF32-294D-AAB2-6303F19C0F38}" destId="{21984D2B-C062-F042-A872-A2D9A22C4D0C}" srcOrd="0" destOrd="0" presId="urn:microsoft.com/office/officeart/2005/8/layout/process5"/>
-    <dgm:cxn modelId="{A9C48A65-B284-9C45-8E61-E06FA0E09308}" type="presOf" srcId="{E6251A7D-5B35-2046-BE21-CB6C64B5A0EB}" destId="{C2FC7C2F-6EEA-F445-BDC2-C4F5C2573CB6}" srcOrd="0" destOrd="0" presId="urn:microsoft.com/office/officeart/2005/8/layout/process5"/>
-    <dgm:cxn modelId="{283DDB57-5D14-3245-9298-1881F9C24CE4}" srcId="{3BC6C5D5-F487-8045-BDA7-A5C5A96E9BDB}" destId="{AD22A924-6B6E-9742-BB1E-ED7D164971C2}" srcOrd="0" destOrd="0" parTransId="{0D3E19D8-E369-1648-84D3-D98100398B84}" sibTransId="{F07EFE35-C7D6-2F4A-ACE1-852E8BCC27F8}"/>
-    <dgm:cxn modelId="{F94A98C6-F826-F646-B563-EC46AE3F6D65}" type="presOf" srcId="{E6251A7D-5B35-2046-BE21-CB6C64B5A0EB}" destId="{BD164B51-9CE3-D040-9951-0CB220B49EB9}" srcOrd="1" destOrd="0" presId="urn:microsoft.com/office/officeart/2005/8/layout/process5"/>
-    <dgm:cxn modelId="{0640BE4E-0CD6-894E-8019-7D7EB20AB680}" srcId="{3BC6C5D5-F487-8045-BDA7-A5C5A96E9BDB}" destId="{F711D389-95A5-144D-A8A1-4ABDD989C0D7}" srcOrd="4" destOrd="0" parTransId="{12F5A045-1ED7-D14B-9FCA-477AA7EFC476}" sibTransId="{1F23692B-FE4B-E74F-8AE3-0C70656CDDEB}"/>
-    <dgm:cxn modelId="{972B118A-C700-C345-A504-FE93A90783DC}" type="presOf" srcId="{1F23692B-FE4B-E74F-8AE3-0C70656CDDEB}" destId="{20955F39-7A33-6145-AED8-600523AC68A6}" srcOrd="0" destOrd="0" presId="urn:microsoft.com/office/officeart/2005/8/layout/process5"/>
-    <dgm:cxn modelId="{50ADE0DD-C7C9-B945-BA68-9E6EBA248104}" srcId="{3BC6C5D5-F487-8045-BDA7-A5C5A96E9BDB}" destId="{D08C936B-7EA2-5E4D-8C40-D57C0BDF2402}" srcOrd="1" destOrd="0" parTransId="{53887434-3C85-2348-9829-7BCCC0252D9A}" sibTransId="{327C20B1-0843-CE4C-8F29-D979A5FC89AD}"/>
-    <dgm:cxn modelId="{F4158DE0-DCFE-CD45-97AE-1BA4468449AD}" srcId="{3BC6C5D5-F487-8045-BDA7-A5C5A96E9BDB}" destId="{58DA7B2F-0AE0-9149-BDBB-44180705219F}" srcOrd="8" destOrd="0" parTransId="{BC853DE1-8341-294B-BCEF-BB7ED1A6AE79}" sibTransId="{E6251A7D-5B35-2046-BE21-CB6C64B5A0EB}"/>
+    <dgm:cxn modelId="{9B350909-2702-FA4D-978C-0389B02A1356}" type="presOf" srcId="{05414E78-B7A0-BE4D-9B45-C65E0397D141}" destId="{6FA43795-8FB5-1D4D-8051-02A937C5DB7C}" srcOrd="0" destOrd="0" presId="urn:microsoft.com/office/officeart/2005/8/layout/process5"/>
     <dgm:cxn modelId="{324F2A0E-EE20-064F-A575-5FA18FFC5700}" type="presParOf" srcId="{3FFA31E3-DC05-3C47-B60E-8E2B7C077C03}" destId="{E57F80F9-44F8-DC49-8E95-3BBC0D03F1ED}" srcOrd="0" destOrd="0" presId="urn:microsoft.com/office/officeart/2005/8/layout/process5"/>
     <dgm:cxn modelId="{D990B8F7-4545-D741-9344-587CAE9DDA4E}" type="presParOf" srcId="{3FFA31E3-DC05-3C47-B60E-8E2B7C077C03}" destId="{2E4DDA71-63BB-094D-AC2D-4AB8D484B16E}" srcOrd="1" destOrd="0" presId="urn:microsoft.com/office/officeart/2005/8/layout/process5"/>
     <dgm:cxn modelId="{29C8AD72-FD8C-A546-9A77-07DAC4B6E6FE}" type="presParOf" srcId="{2E4DDA71-63BB-094D-AC2D-4AB8D484B16E}" destId="{8E6A274D-A0FE-1D4C-93E4-8B82CE196E3B}" srcOrd="0" destOrd="0" presId="urn:microsoft.com/office/officeart/2005/8/layout/process5"/>
@@ -4934,14 +5318,35 @@
         </dgm:presLayoutVars>
       </dgm:prSet>
       <dgm:spPr/>
+      <dgm:t>
+        <a:bodyPr/>
+        <a:lstStyle/>
+        <a:p>
+          <a:endParaRPr lang="en-US"/>
+        </a:p>
+      </dgm:t>
     </dgm:pt>
     <dgm:pt modelId="{2E4DDA71-63BB-094D-AC2D-4AB8D484B16E}" type="pres">
       <dgm:prSet presAssocID="{F07EFE35-C7D6-2F4A-ACE1-852E8BCC27F8}" presName="sibTrans" presStyleLbl="sibTrans2D1" presStyleIdx="0" presStyleCnt="10"/>
       <dgm:spPr/>
+      <dgm:t>
+        <a:bodyPr/>
+        <a:lstStyle/>
+        <a:p>
+          <a:endParaRPr lang="en-US"/>
+        </a:p>
+      </dgm:t>
     </dgm:pt>
     <dgm:pt modelId="{8E6A274D-A0FE-1D4C-93E4-8B82CE196E3B}" type="pres">
       <dgm:prSet presAssocID="{F07EFE35-C7D6-2F4A-ACE1-852E8BCC27F8}" presName="connectorText" presStyleLbl="sibTrans2D1" presStyleIdx="0" presStyleCnt="10"/>
       <dgm:spPr/>
+      <dgm:t>
+        <a:bodyPr/>
+        <a:lstStyle/>
+        <a:p>
+          <a:endParaRPr lang="en-US"/>
+        </a:p>
+      </dgm:t>
     </dgm:pt>
     <dgm:pt modelId="{1C485498-7FB6-E049-B09F-F628CDE14F70}" type="pres">
       <dgm:prSet presAssocID="{D08C936B-7EA2-5E4D-8C40-D57C0BDF2402}" presName="node" presStyleLbl="node1" presStyleIdx="1" presStyleCnt="11" custLinFactX="39846" custLinFactNeighborX="100000" custLinFactNeighborY="23162">
@@ -4950,14 +5355,35 @@
         </dgm:presLayoutVars>
       </dgm:prSet>
       <dgm:spPr/>
+      <dgm:t>
+        <a:bodyPr/>
+        <a:lstStyle/>
+        <a:p>
+          <a:endParaRPr lang="en-US"/>
+        </a:p>
+      </dgm:t>
     </dgm:pt>
     <dgm:pt modelId="{7F931FB3-A9BA-174F-9128-E3CB763512CF}" type="pres">
       <dgm:prSet presAssocID="{327C20B1-0843-CE4C-8F29-D979A5FC89AD}" presName="sibTrans" presStyleLbl="sibTrans2D1" presStyleIdx="1" presStyleCnt="10"/>
       <dgm:spPr/>
+      <dgm:t>
+        <a:bodyPr/>
+        <a:lstStyle/>
+        <a:p>
+          <a:endParaRPr lang="en-US"/>
+        </a:p>
+      </dgm:t>
     </dgm:pt>
     <dgm:pt modelId="{D950472B-4AF5-914A-83A6-61A893741A8F}" type="pres">
       <dgm:prSet presAssocID="{327C20B1-0843-CE4C-8F29-D979A5FC89AD}" presName="connectorText" presStyleLbl="sibTrans2D1" presStyleIdx="1" presStyleCnt="10"/>
       <dgm:spPr/>
+      <dgm:t>
+        <a:bodyPr/>
+        <a:lstStyle/>
+        <a:p>
+          <a:endParaRPr lang="en-US"/>
+        </a:p>
+      </dgm:t>
     </dgm:pt>
     <dgm:pt modelId="{B525638F-6600-2B44-8009-0472B2361A11}" type="pres">
       <dgm:prSet presAssocID="{E45F3AD5-D2F4-D94E-90B2-7AA9F030172E}" presName="node" presStyleLbl="node1" presStyleIdx="2" presStyleCnt="11" custLinFactX="40822" custLinFactNeighborX="100000" custLinFactNeighborY="23162">
@@ -4966,14 +5392,35 @@
         </dgm:presLayoutVars>
       </dgm:prSet>
       <dgm:spPr/>
+      <dgm:t>
+        <a:bodyPr/>
+        <a:lstStyle/>
+        <a:p>
+          <a:endParaRPr lang="en-US"/>
+        </a:p>
+      </dgm:t>
     </dgm:pt>
     <dgm:pt modelId="{21984D2B-C062-F042-A872-A2D9A22C4D0C}" type="pres">
       <dgm:prSet presAssocID="{710A75B3-FF32-294D-AAB2-6303F19C0F38}" presName="sibTrans" presStyleLbl="sibTrans2D1" presStyleIdx="2" presStyleCnt="10"/>
       <dgm:spPr/>
+      <dgm:t>
+        <a:bodyPr/>
+        <a:lstStyle/>
+        <a:p>
+          <a:endParaRPr lang="en-US"/>
+        </a:p>
+      </dgm:t>
     </dgm:pt>
     <dgm:pt modelId="{295D751B-A105-EE42-9529-A46FA718FD65}" type="pres">
       <dgm:prSet presAssocID="{710A75B3-FF32-294D-AAB2-6303F19C0F38}" presName="connectorText" presStyleLbl="sibTrans2D1" presStyleIdx="2" presStyleCnt="10"/>
       <dgm:spPr/>
+      <dgm:t>
+        <a:bodyPr/>
+        <a:lstStyle/>
+        <a:p>
+          <a:endParaRPr lang="en-US"/>
+        </a:p>
+      </dgm:t>
     </dgm:pt>
     <dgm:pt modelId="{607ED82F-0153-9648-85A9-FD2598ED9CD4}" type="pres">
       <dgm:prSet presAssocID="{0C5C60D5-67E7-1447-9645-12655641CA4D}" presName="node" presStyleLbl="node1" presStyleIdx="3" presStyleCnt="11" custLinFactX="40823" custLinFactNeighborX="100000" custLinFactNeighborY="23162">
@@ -4982,14 +5429,35 @@
         </dgm:presLayoutVars>
       </dgm:prSet>
       <dgm:spPr/>
+      <dgm:t>
+        <a:bodyPr/>
+        <a:lstStyle/>
+        <a:p>
+          <a:endParaRPr lang="en-US"/>
+        </a:p>
+      </dgm:t>
     </dgm:pt>
     <dgm:pt modelId="{36F3A529-E509-4D46-8931-0B81FC1641D8}" type="pres">
       <dgm:prSet presAssocID="{274E1360-4211-6C46-B995-93610EBD938A}" presName="sibTrans" presStyleLbl="sibTrans2D1" presStyleIdx="3" presStyleCnt="10"/>
       <dgm:spPr/>
+      <dgm:t>
+        <a:bodyPr/>
+        <a:lstStyle/>
+        <a:p>
+          <a:endParaRPr lang="en-US"/>
+        </a:p>
+      </dgm:t>
     </dgm:pt>
     <dgm:pt modelId="{0F63130F-B27E-3241-99EB-836E0E0D4300}" type="pres">
       <dgm:prSet presAssocID="{274E1360-4211-6C46-B995-93610EBD938A}" presName="connectorText" presStyleLbl="sibTrans2D1" presStyleIdx="3" presStyleCnt="10"/>
       <dgm:spPr/>
+      <dgm:t>
+        <a:bodyPr/>
+        <a:lstStyle/>
+        <a:p>
+          <a:endParaRPr lang="en-US"/>
+        </a:p>
+      </dgm:t>
     </dgm:pt>
     <dgm:pt modelId="{9CDCDBFC-89AE-7742-BA04-469CA2CB8838}" type="pres">
       <dgm:prSet presAssocID="{F711D389-95A5-144D-A8A1-4ABDD989C0D7}" presName="node" presStyleLbl="node1" presStyleIdx="4" presStyleCnt="11" custLinFactY="80660" custLinFactNeighborX="2780" custLinFactNeighborY="100000">
@@ -4998,14 +5466,35 @@
         </dgm:presLayoutVars>
       </dgm:prSet>
       <dgm:spPr/>
+      <dgm:t>
+        <a:bodyPr/>
+        <a:lstStyle/>
+        <a:p>
+          <a:endParaRPr lang="en-US"/>
+        </a:p>
+      </dgm:t>
     </dgm:pt>
     <dgm:pt modelId="{20955F39-7A33-6145-AED8-600523AC68A6}" type="pres">
       <dgm:prSet presAssocID="{1F23692B-FE4B-E74F-8AE3-0C70656CDDEB}" presName="sibTrans" presStyleLbl="sibTrans2D1" presStyleIdx="4" presStyleCnt="10"/>
       <dgm:spPr/>
+      <dgm:t>
+        <a:bodyPr/>
+        <a:lstStyle/>
+        <a:p>
+          <a:endParaRPr lang="en-US"/>
+        </a:p>
+      </dgm:t>
     </dgm:pt>
     <dgm:pt modelId="{6E7E466E-B2C1-0E48-B811-BF510FAE457A}" type="pres">
       <dgm:prSet presAssocID="{1F23692B-FE4B-E74F-8AE3-0C70656CDDEB}" presName="connectorText" presStyleLbl="sibTrans2D1" presStyleIdx="4" presStyleCnt="10"/>
       <dgm:spPr/>
+      <dgm:t>
+        <a:bodyPr/>
+        <a:lstStyle/>
+        <a:p>
+          <a:endParaRPr lang="en-US"/>
+        </a:p>
+      </dgm:t>
     </dgm:pt>
     <dgm:pt modelId="{6FA43795-8FB5-1D4D-8051-02A937C5DB7C}" type="pres">
       <dgm:prSet presAssocID="{05414E78-B7A0-BE4D-9B45-C65E0397D141}" presName="node" presStyleLbl="node1" presStyleIdx="5" presStyleCnt="11" custLinFactX="-37116" custLinFactNeighborX="-100000" custLinFactNeighborY="13897">
@@ -5025,10 +5514,24 @@
     <dgm:pt modelId="{F401399D-B947-3642-BA1A-919842D84B49}" type="pres">
       <dgm:prSet presAssocID="{D19848FA-C9A2-434B-A708-EF1E865C7B6E}" presName="sibTrans" presStyleLbl="sibTrans2D1" presStyleIdx="5" presStyleCnt="10"/>
       <dgm:spPr/>
+      <dgm:t>
+        <a:bodyPr/>
+        <a:lstStyle/>
+        <a:p>
+          <a:endParaRPr lang="en-US"/>
+        </a:p>
+      </dgm:t>
     </dgm:pt>
     <dgm:pt modelId="{F6A40BF3-00AF-F14A-A22D-5C8B56F50956}" type="pres">
       <dgm:prSet presAssocID="{D19848FA-C9A2-434B-A708-EF1E865C7B6E}" presName="connectorText" presStyleLbl="sibTrans2D1" presStyleIdx="5" presStyleCnt="10"/>
       <dgm:spPr/>
+      <dgm:t>
+        <a:bodyPr/>
+        <a:lstStyle/>
+        <a:p>
+          <a:endParaRPr lang="en-US"/>
+        </a:p>
+      </dgm:t>
     </dgm:pt>
     <dgm:pt modelId="{9DE3DB86-0285-A849-8161-3C96DE0C7608}" type="pres">
       <dgm:prSet presAssocID="{EC1B55B6-C057-D74C-9041-07E907C76202}" presName="node" presStyleLbl="node1" presStyleIdx="6" presStyleCnt="11" custLinFactX="-40154" custLinFactNeighborX="-100000" custLinFactNeighborY="4632">
@@ -5048,10 +5551,24 @@
     <dgm:pt modelId="{34394282-55BC-F141-A3B0-616E337B99D1}" type="pres">
       <dgm:prSet presAssocID="{00849A85-2442-934A-8A25-B759498E4A62}" presName="sibTrans" presStyleLbl="sibTrans2D1" presStyleIdx="6" presStyleCnt="10"/>
       <dgm:spPr/>
+      <dgm:t>
+        <a:bodyPr/>
+        <a:lstStyle/>
+        <a:p>
+          <a:endParaRPr lang="en-US"/>
+        </a:p>
+      </dgm:t>
     </dgm:pt>
     <dgm:pt modelId="{7A2A5041-3D2C-4946-BF65-51F27CA7D3DF}" type="pres">
       <dgm:prSet presAssocID="{00849A85-2442-934A-8A25-B759498E4A62}" presName="connectorText" presStyleLbl="sibTrans2D1" presStyleIdx="6" presStyleCnt="10"/>
       <dgm:spPr/>
+      <dgm:t>
+        <a:bodyPr/>
+        <a:lstStyle/>
+        <a:p>
+          <a:endParaRPr lang="en-US"/>
+        </a:p>
+      </dgm:t>
     </dgm:pt>
     <dgm:pt modelId="{1F39E993-1E94-6341-B201-439C32FEBF5B}" type="pres">
       <dgm:prSet presAssocID="{23428979-A1AD-3049-BC3C-615D3FDD8DEC}" presName="node" presStyleLbl="node1" presStyleIdx="7" presStyleCnt="11" custLinFactX="-36190" custLinFactNeighborX="-100000" custLinFactNeighborY="6176">
@@ -5071,10 +5588,24 @@
     <dgm:pt modelId="{5821B350-EAB0-5340-9451-ECC501B044DA}" type="pres">
       <dgm:prSet presAssocID="{9792CB14-D5E2-B740-9A71-BA2AEFA83615}" presName="sibTrans" presStyleLbl="sibTrans2D1" presStyleIdx="7" presStyleCnt="10"/>
       <dgm:spPr/>
+      <dgm:t>
+        <a:bodyPr/>
+        <a:lstStyle/>
+        <a:p>
+          <a:endParaRPr lang="en-US"/>
+        </a:p>
+      </dgm:t>
     </dgm:pt>
     <dgm:pt modelId="{796EEB16-3280-7649-B562-F014A0541C43}" type="pres">
       <dgm:prSet presAssocID="{9792CB14-D5E2-B740-9A71-BA2AEFA83615}" presName="connectorText" presStyleLbl="sibTrans2D1" presStyleIdx="7" presStyleCnt="10"/>
       <dgm:spPr/>
+      <dgm:t>
+        <a:bodyPr/>
+        <a:lstStyle/>
+        <a:p>
+          <a:endParaRPr lang="en-US"/>
+        </a:p>
+      </dgm:t>
     </dgm:pt>
     <dgm:pt modelId="{9769ECA5-076F-E244-B85C-494555CCB762}" type="pres">
       <dgm:prSet presAssocID="{58DA7B2F-0AE0-9149-BDBB-44180705219F}" presName="node" presStyleLbl="node1" presStyleIdx="8" presStyleCnt="11" custLinFactY="57498" custLinFactNeighborX="5560" custLinFactNeighborY="100000">
@@ -5094,10 +5625,24 @@
     <dgm:pt modelId="{C2FC7C2F-6EEA-F445-BDC2-C4F5C2573CB6}" type="pres">
       <dgm:prSet presAssocID="{E6251A7D-5B35-2046-BE21-CB6C64B5A0EB}" presName="sibTrans" presStyleLbl="sibTrans2D1" presStyleIdx="8" presStyleCnt="10"/>
       <dgm:spPr/>
+      <dgm:t>
+        <a:bodyPr/>
+        <a:lstStyle/>
+        <a:p>
+          <a:endParaRPr lang="en-US"/>
+        </a:p>
+      </dgm:t>
     </dgm:pt>
     <dgm:pt modelId="{BD164B51-9CE3-D040-9951-0CB220B49EB9}" type="pres">
       <dgm:prSet presAssocID="{E6251A7D-5B35-2046-BE21-CB6C64B5A0EB}" presName="connectorText" presStyleLbl="sibTrans2D1" presStyleIdx="8" presStyleCnt="10"/>
       <dgm:spPr/>
+      <dgm:t>
+        <a:bodyPr/>
+        <a:lstStyle/>
+        <a:p>
+          <a:endParaRPr lang="en-US"/>
+        </a:p>
+      </dgm:t>
     </dgm:pt>
     <dgm:pt modelId="{E982B981-8AA8-AD42-8D2B-6F18F70DAAB2}" type="pres">
       <dgm:prSet presAssocID="{5E976085-F386-1A47-8335-5EBCA50C089B}" presName="node" presStyleLbl="node1" presStyleIdx="9" presStyleCnt="11" custLinFactX="100000" custLinFactY="55954" custLinFactNeighborX="179846" custLinFactNeighborY="100000">
@@ -5106,14 +5651,35 @@
         </dgm:presLayoutVars>
       </dgm:prSet>
       <dgm:spPr/>
+      <dgm:t>
+        <a:bodyPr/>
+        <a:lstStyle/>
+        <a:p>
+          <a:endParaRPr lang="en-US"/>
+        </a:p>
+      </dgm:t>
     </dgm:pt>
     <dgm:pt modelId="{292071F7-B9B4-064A-A0FC-C8F6FFC03581}" type="pres">
       <dgm:prSet presAssocID="{9A6A8D4F-D4BF-2D4F-A429-2FCA3DD3F17E}" presName="sibTrans" presStyleLbl="sibTrans2D1" presStyleIdx="9" presStyleCnt="10"/>
       <dgm:spPr/>
+      <dgm:t>
+        <a:bodyPr/>
+        <a:lstStyle/>
+        <a:p>
+          <a:endParaRPr lang="en-US"/>
+        </a:p>
+      </dgm:t>
     </dgm:pt>
     <dgm:pt modelId="{FF8A9451-803A-BF43-B898-EA10C246EACC}" type="pres">
       <dgm:prSet presAssocID="{9A6A8D4F-D4BF-2D4F-A429-2FCA3DD3F17E}" presName="connectorText" presStyleLbl="sibTrans2D1" presStyleIdx="9" presStyleCnt="10"/>
       <dgm:spPr/>
+      <dgm:t>
+        <a:bodyPr/>
+        <a:lstStyle/>
+        <a:p>
+          <a:endParaRPr lang="en-US"/>
+        </a:p>
+      </dgm:t>
     </dgm:pt>
     <dgm:pt modelId="{251F8A16-DD93-AC4A-8583-1113BC17AE79}" type="pres">
       <dgm:prSet presAssocID="{E7189776-D4D0-BF49-9A00-A7E6F0765C7D}" presName="node" presStyleLbl="node1" presStyleIdx="10" presStyleCnt="11" custLinFactX="200000" custLinFactNeighborX="221539" custLinFactNeighborY="-9265">
@@ -5122,6 +5688,13 @@
         </dgm:presLayoutVars>
       </dgm:prSet>
       <dgm:spPr/>
+      <dgm:t>
+        <a:bodyPr/>
+        <a:lstStyle/>
+        <a:p>
+          <a:endParaRPr lang="en-US"/>
+        </a:p>
+      </dgm:t>
     </dgm:pt>
   </dgm:ptLst>
   <dgm:cxnLst>
@@ -5164,8 +5737,8 @@
     <dgm:cxn modelId="{283DDB57-5D14-3245-9298-1881F9C24CE4}" srcId="{3BC6C5D5-F487-8045-BDA7-A5C5A96E9BDB}" destId="{AD22A924-6B6E-9742-BB1E-ED7D164971C2}" srcOrd="0" destOrd="0" parTransId="{0D3E19D8-E369-1648-84D3-D98100398B84}" sibTransId="{F07EFE35-C7D6-2F4A-ACE1-852E8BCC27F8}"/>
     <dgm:cxn modelId="{98A61102-4416-0E42-9F86-2572BE778E09}" type="presOf" srcId="{1F23692B-FE4B-E74F-8AE3-0C70656CDDEB}" destId="{20955F39-7A33-6145-AED8-600523AC68A6}" srcOrd="0" destOrd="0" presId="urn:microsoft.com/office/officeart/2005/8/layout/process5"/>
     <dgm:cxn modelId="{0640BE4E-0CD6-894E-8019-7D7EB20AB680}" srcId="{3BC6C5D5-F487-8045-BDA7-A5C5A96E9BDB}" destId="{F711D389-95A5-144D-A8A1-4ABDD989C0D7}" srcOrd="4" destOrd="0" parTransId="{12F5A045-1ED7-D14B-9FCA-477AA7EFC476}" sibTransId="{1F23692B-FE4B-E74F-8AE3-0C70656CDDEB}"/>
+    <dgm:cxn modelId="{28881007-107D-A14C-8F65-C6BFC16E3C8A}" type="presOf" srcId="{E6251A7D-5B35-2046-BE21-CB6C64B5A0EB}" destId="{BD164B51-9CE3-D040-9951-0CB220B49EB9}" srcOrd="1" destOrd="0" presId="urn:microsoft.com/office/officeart/2005/8/layout/process5"/>
     <dgm:cxn modelId="{4066D3E9-A2DE-FF40-9170-E516EA3E4F57}" type="presOf" srcId="{EC1B55B6-C057-D74C-9041-07E907C76202}" destId="{9DE3DB86-0285-A849-8161-3C96DE0C7608}" srcOrd="0" destOrd="0" presId="urn:microsoft.com/office/officeart/2005/8/layout/process5"/>
-    <dgm:cxn modelId="{28881007-107D-A14C-8F65-C6BFC16E3C8A}" type="presOf" srcId="{E6251A7D-5B35-2046-BE21-CB6C64B5A0EB}" destId="{BD164B51-9CE3-D040-9951-0CB220B49EB9}" srcOrd="1" destOrd="0" presId="urn:microsoft.com/office/officeart/2005/8/layout/process5"/>
     <dgm:cxn modelId="{50ADE0DD-C7C9-B945-BA68-9E6EBA248104}" srcId="{3BC6C5D5-F487-8045-BDA7-A5C5A96E9BDB}" destId="{D08C936B-7EA2-5E4D-8C40-D57C0BDF2402}" srcOrd="1" destOrd="0" parTransId="{53887434-3C85-2348-9829-7BCCC0252D9A}" sibTransId="{327C20B1-0843-CE4C-8F29-D979A5FC89AD}"/>
     <dgm:cxn modelId="{F4158DE0-DCFE-CD45-97AE-1BA4468449AD}" srcId="{3BC6C5D5-F487-8045-BDA7-A5C5A96E9BDB}" destId="{58DA7B2F-0AE0-9149-BDBB-44180705219F}" srcOrd="8" destOrd="0" parTransId="{BC853DE1-8341-294B-BCEF-BB7ED1A6AE79}" sibTransId="{E6251A7D-5B35-2046-BE21-CB6C64B5A0EB}"/>
     <dgm:cxn modelId="{E21F51DA-AA49-6D46-BBC6-4C386E20C58D}" type="presParOf" srcId="{3FFA31E3-DC05-3C47-B60E-8E2B7C077C03}" destId="{E57F80F9-44F8-DC49-8E95-3BBC0D03F1ED}" srcOrd="0" destOrd="0" presId="urn:microsoft.com/office/officeart/2005/8/layout/process5"/>
@@ -13311,7 +13884,7 @@
           <a:p>
             <a:fld id="{56607AD3-58DA-AB4B-8E21-5FF473DCEAA2}" type="datetimeFigureOut">
               <a:rPr lang="en-US" smtClean="0"/>
-              <a:t>11/5/17</a:t>
+              <a:t>11/7/17</a:t>
             </a:fld>
             <a:endParaRPr lang="en-US"/>
           </a:p>
@@ -13794,7 +14367,7 @@
           <a:p>
             <a:fld id="{500C9FCF-246C-AF49-869C-16427312FE51}" type="datetime1">
               <a:rPr lang="en-GB" smtClean="0"/>
-              <a:t>05/11/2017</a:t>
+              <a:t>07/11/2017</a:t>
             </a:fld>
             <a:endParaRPr lang="en-US"/>
           </a:p>
@@ -13964,7 +14537,7 @@
           <a:p>
             <a:fld id="{F6718F1E-40C6-C74F-B45B-8399606EA300}" type="datetime1">
               <a:rPr lang="en-GB" smtClean="0"/>
-              <a:t>05/11/2017</a:t>
+              <a:t>07/11/2017</a:t>
             </a:fld>
             <a:endParaRPr lang="en-US"/>
           </a:p>
@@ -14144,7 +14717,7 @@
           <a:p>
             <a:fld id="{DD84B5EB-C31D-1B42-B0BC-D7555C580BED}" type="datetime1">
               <a:rPr lang="en-GB" smtClean="0"/>
-              <a:t>05/11/2017</a:t>
+              <a:t>07/11/2017</a:t>
             </a:fld>
             <a:endParaRPr lang="en-US"/>
           </a:p>
@@ -14314,7 +14887,7 @@
           <a:p>
             <a:fld id="{AAF2A1A8-DC22-E94C-B032-9A792292BEF6}" type="datetime1">
               <a:rPr lang="en-GB" smtClean="0"/>
-              <a:t>05/11/2017</a:t>
+              <a:t>07/11/2017</a:t>
             </a:fld>
             <a:endParaRPr lang="en-US"/>
           </a:p>
@@ -14560,7 +15133,7 @@
           <a:p>
             <a:fld id="{63664F86-96EE-504A-8B2B-766BE715893F}" type="datetime1">
               <a:rPr lang="en-GB" smtClean="0"/>
-              <a:t>05/11/2017</a:t>
+              <a:t>07/11/2017</a:t>
             </a:fld>
             <a:endParaRPr lang="en-US"/>
           </a:p>
@@ -14792,7 +15365,7 @@
           <a:p>
             <a:fld id="{FC8C48C1-1E7E-8D42-A4E2-52748A598927}" type="datetime1">
               <a:rPr lang="en-GB" smtClean="0"/>
-              <a:t>05/11/2017</a:t>
+              <a:t>07/11/2017</a:t>
             </a:fld>
             <a:endParaRPr lang="en-US"/>
           </a:p>
@@ -15159,7 +15732,7 @@
           <a:p>
             <a:fld id="{3CDEFCBB-2D3A-8643-9FF0-94CAB22561EF}" type="datetime1">
               <a:rPr lang="en-GB" smtClean="0"/>
-              <a:t>05/11/2017</a:t>
+              <a:t>07/11/2017</a:t>
             </a:fld>
             <a:endParaRPr lang="en-US"/>
           </a:p>
@@ -15277,7 +15850,7 @@
           <a:p>
             <a:fld id="{6FCE6F58-23EC-7846-A777-71CB5A6EBAB5}" type="datetime1">
               <a:rPr lang="en-GB" smtClean="0"/>
-              <a:t>05/11/2017</a:t>
+              <a:t>07/11/2017</a:t>
             </a:fld>
             <a:endParaRPr lang="en-US"/>
           </a:p>
@@ -15372,7 +15945,7 @@
           <a:p>
             <a:fld id="{9A8028DA-6389-6448-A546-E822FD51FDE7}" type="datetime1">
               <a:rPr lang="en-GB" smtClean="0"/>
-              <a:t>05/11/2017</a:t>
+              <a:t>07/11/2017</a:t>
             </a:fld>
             <a:endParaRPr lang="en-US"/>
           </a:p>
@@ -15649,7 +16222,7 @@
           <a:p>
             <a:fld id="{8D29ADBA-A049-FA4F-B39F-E54DB8823685}" type="datetime1">
               <a:rPr lang="en-GB" smtClean="0"/>
-              <a:t>05/11/2017</a:t>
+              <a:t>07/11/2017</a:t>
             </a:fld>
             <a:endParaRPr lang="en-US"/>
           </a:p>
@@ -15902,7 +16475,7 @@
           <a:p>
             <a:fld id="{46810F60-D916-C34B-BDBC-1ABCBB8EDDB5}" type="datetime1">
               <a:rPr lang="en-GB" smtClean="0"/>
-              <a:t>05/11/2017</a:t>
+              <a:t>07/11/2017</a:t>
             </a:fld>
             <a:endParaRPr lang="en-US"/>
           </a:p>
@@ -16115,7 +16688,7 @@
           <a:p>
             <a:fld id="{53492681-4792-F44F-BB77-ADA4C685DBF8}" type="datetime1">
               <a:rPr lang="en-GB" smtClean="0"/>
-              <a:t>05/11/2017</a:t>
+              <a:t>07/11/2017</a:t>
             </a:fld>
             <a:endParaRPr lang="en-US"/>
           </a:p>
@@ -17816,7 +18389,7 @@
       </p:sp>
       <p:pic>
         <p:nvPicPr>
-          <p:cNvPr id="5" name="Picture 4"/>
+          <p:cNvPr id="3" name="Picture 2"/>
           <p:cNvPicPr>
             <a:picLocks noChangeAspect="1"/>
           </p:cNvPicPr>
@@ -17836,8 +18409,8 @@
         </p:blipFill>
         <p:spPr>
           <a:xfrm>
-            <a:off x="838200" y="1841988"/>
-            <a:ext cx="10947400" cy="3670300"/>
+            <a:off x="510638" y="2001668"/>
+            <a:ext cx="11146971" cy="3224981"/>
           </a:xfrm>
           <a:prstGeom prst="rect">
             <a:avLst/>
@@ -18450,10 +19023,40 @@
           </a:p>
         </p:txBody>
       </p:sp>
+      <p:pic>
+        <p:nvPicPr>
+          <p:cNvPr id="3" name="Picture 2"/>
+          <p:cNvPicPr>
+            <a:picLocks noChangeAspect="1"/>
+          </p:cNvPicPr>
+          <p:nvPr/>
+        </p:nvPicPr>
+        <p:blipFill>
+          <a:blip r:embed="rId2">
+            <a:extLst>
+              <a:ext uri="{28A0092B-C50C-407E-A947-70E740481C1C}">
+                <a14:useLocalDpi xmlns:a14="http://schemas.microsoft.com/office/drawing/2010/main" val="0"/>
+              </a:ext>
+            </a:extLst>
+          </a:blip>
+          <a:stretch>
+            <a:fillRect/>
+          </a:stretch>
+        </p:blipFill>
+        <p:spPr>
+          <a:xfrm>
+            <a:off x="748349" y="1690688"/>
+            <a:ext cx="3668188" cy="2966027"/>
+          </a:xfrm>
+          <a:prstGeom prst="rect">
+            <a:avLst/>
+          </a:prstGeom>
+        </p:spPr>
+      </p:pic>
     </p:spTree>
     <p:extLst>
       <p:ext uri="{BB962C8B-B14F-4D97-AF65-F5344CB8AC3E}">
-        <p14:creationId xmlns:p14="http://schemas.microsoft.com/office/powerpoint/2010/main" val="1974936677"/>
+        <p14:creationId xmlns:p14="http://schemas.microsoft.com/office/powerpoint/2010/main" val="216555761"/>
       </p:ext>
     </p:extLst>
   </p:cSld>
@@ -18464,6 +19067,316 @@
 </file>
 
 <file path=ppt/slides/slide23.xml><?xml version="1.0" encoding="utf-8"?>
+<p:sld xmlns:a="http://schemas.openxmlformats.org/drawingml/2006/main" xmlns:r="http://schemas.openxmlformats.org/officeDocument/2006/relationships" xmlns:p="http://schemas.openxmlformats.org/presentationml/2006/main">
+  <p:cSld>
+    <p:spTree>
+      <p:nvGrpSpPr>
+        <p:cNvPr id="1" name=""/>
+        <p:cNvGrpSpPr/>
+        <p:nvPr/>
+      </p:nvGrpSpPr>
+      <p:grpSpPr>
+        <a:xfrm>
+          <a:off x="0" y="0"/>
+          <a:ext cx="0" cy="0"/>
+          <a:chOff x="0" y="0"/>
+          <a:chExt cx="0" cy="0"/>
+        </a:xfrm>
+      </p:grpSpPr>
+      <p:sp>
+        <p:nvSpPr>
+          <p:cNvPr id="2" name="Title 1"/>
+          <p:cNvSpPr>
+            <a:spLocks noGrp="1"/>
+          </p:cNvSpPr>
+          <p:nvPr>
+            <p:ph type="title"/>
+          </p:nvPr>
+        </p:nvSpPr>
+        <p:spPr/>
+        <p:txBody>
+          <a:bodyPr/>
+          <a:lstStyle/>
+          <a:p>
+            <a:r>
+              <a:rPr lang="en-US" dirty="0" err="1" smtClean="0"/>
+              <a:t>Phyloseq</a:t>
+            </a:r>
+            <a:r>
+              <a:rPr lang="en-US" dirty="0" smtClean="0"/>
+              <a:t> possibilities</a:t>
+            </a:r>
+            <a:endParaRPr lang="en-US" dirty="0"/>
+          </a:p>
+        </p:txBody>
+      </p:sp>
+      <p:sp>
+        <p:nvSpPr>
+          <p:cNvPr id="4" name="Slide Number Placeholder 3"/>
+          <p:cNvSpPr>
+            <a:spLocks noGrp="1"/>
+          </p:cNvSpPr>
+          <p:nvPr>
+            <p:ph type="sldNum" sz="quarter" idx="12"/>
+          </p:nvPr>
+        </p:nvSpPr>
+        <p:spPr/>
+        <p:txBody>
+          <a:bodyPr/>
+          <a:lstStyle/>
+          <a:p>
+            <a:fld id="{303FDBAA-3A93-914C-828A-7806EC0B496F}" type="slidenum">
+              <a:rPr lang="en-US" smtClean="0"/>
+              <a:t>23</a:t>
+            </a:fld>
+            <a:endParaRPr lang="en-US"/>
+          </a:p>
+        </p:txBody>
+      </p:sp>
+      <p:pic>
+        <p:nvPicPr>
+          <p:cNvPr id="3" name="Picture 2"/>
+          <p:cNvPicPr>
+            <a:picLocks noChangeAspect="1"/>
+          </p:cNvPicPr>
+          <p:nvPr/>
+        </p:nvPicPr>
+        <p:blipFill>
+          <a:blip r:embed="rId2">
+            <a:extLst>
+              <a:ext uri="{28A0092B-C50C-407E-A947-70E740481C1C}">
+                <a14:useLocalDpi xmlns:a14="http://schemas.microsoft.com/office/drawing/2010/main" val="0"/>
+              </a:ext>
+            </a:extLst>
+          </a:blip>
+          <a:stretch>
+            <a:fillRect/>
+          </a:stretch>
+        </p:blipFill>
+        <p:spPr>
+          <a:xfrm>
+            <a:off x="748349" y="1690688"/>
+            <a:ext cx="3668188" cy="2966027"/>
+          </a:xfrm>
+          <a:prstGeom prst="rect">
+            <a:avLst/>
+          </a:prstGeom>
+        </p:spPr>
+      </p:pic>
+      <p:pic>
+        <p:nvPicPr>
+          <p:cNvPr id="5" name="Picture 4"/>
+          <p:cNvPicPr>
+            <a:picLocks noChangeAspect="1"/>
+          </p:cNvPicPr>
+          <p:nvPr/>
+        </p:nvPicPr>
+        <p:blipFill>
+          <a:blip r:embed="rId3">
+            <a:extLst>
+              <a:ext uri="{28A0092B-C50C-407E-A947-70E740481C1C}">
+                <a14:useLocalDpi xmlns:a14="http://schemas.microsoft.com/office/drawing/2010/main" val="0"/>
+              </a:ext>
+            </a:extLst>
+          </a:blip>
+          <a:stretch>
+            <a:fillRect/>
+          </a:stretch>
+        </p:blipFill>
+        <p:spPr>
+          <a:xfrm>
+            <a:off x="7633057" y="1603169"/>
+            <a:ext cx="4149904" cy="3700648"/>
+          </a:xfrm>
+          <a:prstGeom prst="rect">
+            <a:avLst/>
+          </a:prstGeom>
+        </p:spPr>
+      </p:pic>
+    </p:spTree>
+    <p:extLst>
+      <p:ext uri="{BB962C8B-B14F-4D97-AF65-F5344CB8AC3E}">
+        <p14:creationId xmlns:p14="http://schemas.microsoft.com/office/powerpoint/2010/main" val="1815377109"/>
+      </p:ext>
+    </p:extLst>
+  </p:cSld>
+  <p:clrMapOvr>
+    <a:masterClrMapping/>
+  </p:clrMapOvr>
+</p:sld>
+</file>
+
+<file path=ppt/slides/slide24.xml><?xml version="1.0" encoding="utf-8"?>
+<p:sld xmlns:a="http://schemas.openxmlformats.org/drawingml/2006/main" xmlns:r="http://schemas.openxmlformats.org/officeDocument/2006/relationships" xmlns:p="http://schemas.openxmlformats.org/presentationml/2006/main">
+  <p:cSld>
+    <p:spTree>
+      <p:nvGrpSpPr>
+        <p:cNvPr id="1" name=""/>
+        <p:cNvGrpSpPr/>
+        <p:nvPr/>
+      </p:nvGrpSpPr>
+      <p:grpSpPr>
+        <a:xfrm>
+          <a:off x="0" y="0"/>
+          <a:ext cx="0" cy="0"/>
+          <a:chOff x="0" y="0"/>
+          <a:chExt cx="0" cy="0"/>
+        </a:xfrm>
+      </p:grpSpPr>
+      <p:sp>
+        <p:nvSpPr>
+          <p:cNvPr id="2" name="Title 1"/>
+          <p:cNvSpPr>
+            <a:spLocks noGrp="1"/>
+          </p:cNvSpPr>
+          <p:nvPr>
+            <p:ph type="title"/>
+          </p:nvPr>
+        </p:nvSpPr>
+        <p:spPr/>
+        <p:txBody>
+          <a:bodyPr/>
+          <a:lstStyle/>
+          <a:p>
+            <a:r>
+              <a:rPr lang="en-US" dirty="0" err="1" smtClean="0"/>
+              <a:t>Phyloseq</a:t>
+            </a:r>
+            <a:r>
+              <a:rPr lang="en-US" dirty="0" smtClean="0"/>
+              <a:t> possibilities</a:t>
+            </a:r>
+            <a:endParaRPr lang="en-US" dirty="0"/>
+          </a:p>
+        </p:txBody>
+      </p:sp>
+      <p:sp>
+        <p:nvSpPr>
+          <p:cNvPr id="4" name="Slide Number Placeholder 3"/>
+          <p:cNvSpPr>
+            <a:spLocks noGrp="1"/>
+          </p:cNvSpPr>
+          <p:nvPr>
+            <p:ph type="sldNum" sz="quarter" idx="12"/>
+          </p:nvPr>
+        </p:nvSpPr>
+        <p:spPr/>
+        <p:txBody>
+          <a:bodyPr/>
+          <a:lstStyle/>
+          <a:p>
+            <a:fld id="{303FDBAA-3A93-914C-828A-7806EC0B496F}" type="slidenum">
+              <a:rPr lang="en-US" smtClean="0"/>
+              <a:t>24</a:t>
+            </a:fld>
+            <a:endParaRPr lang="en-US"/>
+          </a:p>
+        </p:txBody>
+      </p:sp>
+      <p:pic>
+        <p:nvPicPr>
+          <p:cNvPr id="3" name="Picture 2"/>
+          <p:cNvPicPr>
+            <a:picLocks noChangeAspect="1"/>
+          </p:cNvPicPr>
+          <p:nvPr/>
+        </p:nvPicPr>
+        <p:blipFill>
+          <a:blip r:embed="rId2">
+            <a:extLst>
+              <a:ext uri="{28A0092B-C50C-407E-A947-70E740481C1C}">
+                <a14:useLocalDpi xmlns:a14="http://schemas.microsoft.com/office/drawing/2010/main" val="0"/>
+              </a:ext>
+            </a:extLst>
+          </a:blip>
+          <a:stretch>
+            <a:fillRect/>
+          </a:stretch>
+        </p:blipFill>
+        <p:spPr>
+          <a:xfrm>
+            <a:off x="748349" y="1690688"/>
+            <a:ext cx="3668188" cy="2966027"/>
+          </a:xfrm>
+          <a:prstGeom prst="rect">
+            <a:avLst/>
+          </a:prstGeom>
+        </p:spPr>
+      </p:pic>
+      <p:pic>
+        <p:nvPicPr>
+          <p:cNvPr id="5" name="Picture 4"/>
+          <p:cNvPicPr>
+            <a:picLocks noChangeAspect="1"/>
+          </p:cNvPicPr>
+          <p:nvPr/>
+        </p:nvPicPr>
+        <p:blipFill>
+          <a:blip r:embed="rId3">
+            <a:extLst>
+              <a:ext uri="{28A0092B-C50C-407E-A947-70E740481C1C}">
+                <a14:useLocalDpi xmlns:a14="http://schemas.microsoft.com/office/drawing/2010/main" val="0"/>
+              </a:ext>
+            </a:extLst>
+          </a:blip>
+          <a:stretch>
+            <a:fillRect/>
+          </a:stretch>
+        </p:blipFill>
+        <p:spPr>
+          <a:xfrm>
+            <a:off x="7633057" y="1603169"/>
+            <a:ext cx="4149904" cy="3700648"/>
+          </a:xfrm>
+          <a:prstGeom prst="rect">
+            <a:avLst/>
+          </a:prstGeom>
+        </p:spPr>
+      </p:pic>
+      <p:pic>
+        <p:nvPicPr>
+          <p:cNvPr id="6" name="Picture 5"/>
+          <p:cNvPicPr>
+            <a:picLocks noChangeAspect="1"/>
+          </p:cNvPicPr>
+          <p:nvPr/>
+        </p:nvPicPr>
+        <p:blipFill>
+          <a:blip r:embed="rId4">
+            <a:extLst>
+              <a:ext uri="{28A0092B-C50C-407E-A947-70E740481C1C}">
+                <a14:useLocalDpi xmlns:a14="http://schemas.microsoft.com/office/drawing/2010/main" val="0"/>
+              </a:ext>
+            </a:extLst>
+          </a:blip>
+          <a:stretch>
+            <a:fillRect/>
+          </a:stretch>
+        </p:blipFill>
+        <p:spPr>
+          <a:xfrm>
+            <a:off x="4450716" y="3521755"/>
+            <a:ext cx="3665525" cy="3017157"/>
+          </a:xfrm>
+          <a:prstGeom prst="rect">
+            <a:avLst/>
+          </a:prstGeom>
+        </p:spPr>
+      </p:pic>
+    </p:spTree>
+    <p:extLst>
+      <p:ext uri="{BB962C8B-B14F-4D97-AF65-F5344CB8AC3E}">
+        <p14:creationId xmlns:p14="http://schemas.microsoft.com/office/powerpoint/2010/main" val="1742898034"/>
+      </p:ext>
+    </p:extLst>
+  </p:cSld>
+  <p:clrMapOvr>
+    <a:masterClrMapping/>
+  </p:clrMapOvr>
+</p:sld>
+</file>
+
+<file path=ppt/slides/slide25.xml><?xml version="1.0" encoding="utf-8"?>
 <p:sld xmlns:a="http://schemas.openxmlformats.org/drawingml/2006/main" xmlns:r="http://schemas.openxmlformats.org/officeDocument/2006/relationships" xmlns:p="http://schemas.openxmlformats.org/presentationml/2006/main">
   <p:cSld>
     <p:spTree>
@@ -18566,7 +19479,7 @@
           <a:p>
             <a:fld id="{303FDBAA-3A93-914C-828A-7806EC0B496F}" type="slidenum">
               <a:rPr lang="en-US" smtClean="0"/>
-              <a:t>23</a:t>
+              <a:t>25</a:t>
             </a:fld>
             <a:endParaRPr lang="en-US"/>
           </a:p>
@@ -18585,102 +19498,7 @@
 </p:sld>
 </file>
 
-<file path=ppt/slides/slide24.xml><?xml version="1.0" encoding="utf-8"?>
-<p:sld xmlns:a="http://schemas.openxmlformats.org/drawingml/2006/main" xmlns:r="http://schemas.openxmlformats.org/officeDocument/2006/relationships" xmlns:p="http://schemas.openxmlformats.org/presentationml/2006/main">
-  <p:cSld>
-    <p:spTree>
-      <p:nvGrpSpPr>
-        <p:cNvPr id="1" name=""/>
-        <p:cNvGrpSpPr/>
-        <p:nvPr/>
-      </p:nvGrpSpPr>
-      <p:grpSpPr>
-        <a:xfrm>
-          <a:off x="0" y="0"/>
-          <a:ext cx="0" cy="0"/>
-          <a:chOff x="0" y="0"/>
-          <a:chExt cx="0" cy="0"/>
-        </a:xfrm>
-      </p:grpSpPr>
-      <p:sp>
-        <p:nvSpPr>
-          <p:cNvPr id="2" name="Title 1"/>
-          <p:cNvSpPr>
-            <a:spLocks noGrp="1"/>
-          </p:cNvSpPr>
-          <p:nvPr>
-            <p:ph type="title"/>
-          </p:nvPr>
-        </p:nvSpPr>
-        <p:spPr/>
-        <p:txBody>
-          <a:bodyPr/>
-          <a:lstStyle/>
-          <a:p>
-            <a:r>
-              <a:rPr lang="en-US" dirty="0" smtClean="0"/>
-              <a:t>References</a:t>
-            </a:r>
-            <a:endParaRPr lang="en-US" dirty="0"/>
-          </a:p>
-        </p:txBody>
-      </p:sp>
-      <p:sp>
-        <p:nvSpPr>
-          <p:cNvPr id="3" name="Content Placeholder 2"/>
-          <p:cNvSpPr>
-            <a:spLocks noGrp="1"/>
-          </p:cNvSpPr>
-          <p:nvPr>
-            <p:ph idx="1"/>
-          </p:nvPr>
-        </p:nvSpPr>
-        <p:spPr/>
-        <p:txBody>
-          <a:bodyPr/>
-          <a:lstStyle/>
-          <a:p>
-            <a:endParaRPr lang="en-US" dirty="0"/>
-          </a:p>
-        </p:txBody>
-      </p:sp>
-      <p:sp>
-        <p:nvSpPr>
-          <p:cNvPr id="4" name="Slide Number Placeholder 3"/>
-          <p:cNvSpPr>
-            <a:spLocks noGrp="1"/>
-          </p:cNvSpPr>
-          <p:nvPr>
-            <p:ph type="sldNum" sz="quarter" idx="12"/>
-          </p:nvPr>
-        </p:nvSpPr>
-        <p:spPr/>
-        <p:txBody>
-          <a:bodyPr/>
-          <a:lstStyle/>
-          <a:p>
-            <a:fld id="{303FDBAA-3A93-914C-828A-7806EC0B496F}" type="slidenum">
-              <a:rPr lang="en-US" smtClean="0"/>
-              <a:t>24</a:t>
-            </a:fld>
-            <a:endParaRPr lang="en-US"/>
-          </a:p>
-        </p:txBody>
-      </p:sp>
-    </p:spTree>
-    <p:extLst>
-      <p:ext uri="{BB962C8B-B14F-4D97-AF65-F5344CB8AC3E}">
-        <p14:creationId xmlns:p14="http://schemas.microsoft.com/office/powerpoint/2010/main" val="1877506262"/>
-      </p:ext>
-    </p:extLst>
-  </p:cSld>
-  <p:clrMapOvr>
-    <a:masterClrMapping/>
-  </p:clrMapOvr>
-</p:sld>
-</file>
-
-<file path=ppt/slides/slide25.xml><?xml version="1.0" encoding="utf-8"?>
+<file path=ppt/slides/slide26.xml><?xml version="1.0" encoding="utf-8"?>
 <p:sld xmlns:a="http://schemas.openxmlformats.org/drawingml/2006/main" xmlns:r="http://schemas.openxmlformats.org/officeDocument/2006/relationships" xmlns:p="http://schemas.openxmlformats.org/presentationml/2006/main">
   <p:cSld>
     <p:spTree>
@@ -18745,72 +19563,12 @@
           <a:p>
             <a:fld id="{303FDBAA-3A93-914C-828A-7806EC0B496F}" type="slidenum">
               <a:rPr lang="en-US" smtClean="0"/>
-              <a:t>25</a:t>
+              <a:t>26</a:t>
             </a:fld>
             <a:endParaRPr lang="en-US"/>
           </a:p>
         </p:txBody>
       </p:sp>
-      <p:pic>
-        <p:nvPicPr>
-          <p:cNvPr id="7" name="Picture 6"/>
-          <p:cNvPicPr>
-            <a:picLocks noChangeAspect="1"/>
-          </p:cNvPicPr>
-          <p:nvPr/>
-        </p:nvPicPr>
-        <p:blipFill>
-          <a:blip r:embed="rId2">
-            <a:extLst>
-              <a:ext uri="{28A0092B-C50C-407E-A947-70E740481C1C}">
-                <a14:useLocalDpi xmlns:a14="http://schemas.microsoft.com/office/drawing/2010/main" val="0"/>
-              </a:ext>
-            </a:extLst>
-          </a:blip>
-          <a:stretch>
-            <a:fillRect/>
-          </a:stretch>
-        </p:blipFill>
-        <p:spPr>
-          <a:xfrm>
-            <a:off x="3305908" y="1690688"/>
-            <a:ext cx="1455371" cy="1455371"/>
-          </a:xfrm>
-          <a:prstGeom prst="rect">
-            <a:avLst/>
-          </a:prstGeom>
-        </p:spPr>
-      </p:pic>
-      <p:pic>
-        <p:nvPicPr>
-          <p:cNvPr id="10" name="Picture 9"/>
-          <p:cNvPicPr>
-            <a:picLocks noChangeAspect="1"/>
-          </p:cNvPicPr>
-          <p:nvPr/>
-        </p:nvPicPr>
-        <p:blipFill>
-          <a:blip r:embed="rId3">
-            <a:extLst>
-              <a:ext uri="{28A0092B-C50C-407E-A947-70E740481C1C}">
-                <a14:useLocalDpi xmlns:a14="http://schemas.microsoft.com/office/drawing/2010/main" val="0"/>
-              </a:ext>
-            </a:extLst>
-          </a:blip>
-          <a:stretch>
-            <a:fillRect/>
-          </a:stretch>
-        </p:blipFill>
-        <p:spPr>
-          <a:xfrm>
-            <a:off x="838200" y="1690688"/>
-            <a:ext cx="2467708" cy="1462032"/>
-          </a:xfrm>
-          <a:prstGeom prst="rect">
-            <a:avLst/>
-          </a:prstGeom>
-        </p:spPr>
-      </p:pic>
     </p:spTree>
     <p:extLst>
       <p:ext uri="{BB962C8B-B14F-4D97-AF65-F5344CB8AC3E}">
@@ -18925,7 +19683,7 @@
           <a:p>
             <a:r>
               <a:rPr lang="en-US" dirty="0" smtClean="0"/>
-              <a:t>Full stack workflow available in R</a:t>
+              <a:t>Finds Amplicon Sequence Variants (ASVs)</a:t>
             </a:r>
             <a:endParaRPr lang="en-US" dirty="0" smtClean="0"/>
           </a:p>

</xml_diff>